<commit_message>
L16 Add home task requirements
</commit_message>
<xml_diff>
--- a/Lectures/Lesson 16 - Spring MVC.pptx
+++ b/Lectures/Lesson 16 - Spring MVC.pptx
@@ -1405,7 +1405,7 @@
           <a:p>
             <a:fld id="{812D7E2C-03C1-4B92-BBE3-2FB5C5D5BF8B}" type="slidenum">
               <a:rPr lang="ru-RU" smtClean="0"/>
-              <a:t>‹№›</a:t>
+              <a:t>‹#›</a:t>
             </a:fld>
             <a:endParaRPr lang="ru-RU"/>
           </a:p>
@@ -2189,7 +2189,7 @@
           <a:p>
             <a:fld id="{1953C272-8C72-41F6-9C12-11750B48D95E}" type="slidenum">
               <a:rPr lang="ru-RU" smtClean="0"/>
-              <a:t>‹№›</a:t>
+              <a:t>‹#›</a:t>
             </a:fld>
             <a:endParaRPr lang="ru-RU"/>
           </a:p>
@@ -2357,7 +2357,7 @@
           <a:p>
             <a:fld id="{1953C272-8C72-41F6-9C12-11750B48D95E}" type="slidenum">
               <a:rPr lang="ru-RU" smtClean="0"/>
-              <a:t>‹№›</a:t>
+              <a:t>‹#›</a:t>
             </a:fld>
             <a:endParaRPr lang="ru-RU"/>
           </a:p>
@@ -2535,7 +2535,7 @@
           <a:p>
             <a:fld id="{1953C272-8C72-41F6-9C12-11750B48D95E}" type="slidenum">
               <a:rPr lang="ru-RU" smtClean="0"/>
-              <a:t>‹№›</a:t>
+              <a:t>‹#›</a:t>
             </a:fld>
             <a:endParaRPr lang="ru-RU"/>
           </a:p>
@@ -2703,7 +2703,7 @@
           <a:p>
             <a:fld id="{1953C272-8C72-41F6-9C12-11750B48D95E}" type="slidenum">
               <a:rPr lang="ru-RU" smtClean="0"/>
-              <a:t>‹№›</a:t>
+              <a:t>‹#›</a:t>
             </a:fld>
             <a:endParaRPr lang="ru-RU"/>
           </a:p>
@@ -2948,7 +2948,7 @@
           <a:p>
             <a:fld id="{1953C272-8C72-41F6-9C12-11750B48D95E}" type="slidenum">
               <a:rPr lang="ru-RU" smtClean="0"/>
-              <a:t>‹№›</a:t>
+              <a:t>‹#›</a:t>
             </a:fld>
             <a:endParaRPr lang="ru-RU"/>
           </a:p>
@@ -3177,7 +3177,7 @@
           <a:p>
             <a:fld id="{1953C272-8C72-41F6-9C12-11750B48D95E}" type="slidenum">
               <a:rPr lang="ru-RU" smtClean="0"/>
-              <a:t>‹№›</a:t>
+              <a:t>‹#›</a:t>
             </a:fld>
             <a:endParaRPr lang="ru-RU"/>
           </a:p>
@@ -3541,7 +3541,7 @@
           <a:p>
             <a:fld id="{1953C272-8C72-41F6-9C12-11750B48D95E}" type="slidenum">
               <a:rPr lang="ru-RU" smtClean="0"/>
-              <a:t>‹№›</a:t>
+              <a:t>‹#›</a:t>
             </a:fld>
             <a:endParaRPr lang="ru-RU"/>
           </a:p>
@@ -3658,7 +3658,7 @@
           <a:p>
             <a:fld id="{1953C272-8C72-41F6-9C12-11750B48D95E}" type="slidenum">
               <a:rPr lang="ru-RU" smtClean="0"/>
-              <a:t>‹№›</a:t>
+              <a:t>‹#›</a:t>
             </a:fld>
             <a:endParaRPr lang="ru-RU"/>
           </a:p>
@@ -3753,7 +3753,7 @@
           <a:p>
             <a:fld id="{1953C272-8C72-41F6-9C12-11750B48D95E}" type="slidenum">
               <a:rPr lang="ru-RU" smtClean="0"/>
-              <a:t>‹№›</a:t>
+              <a:t>‹#›</a:t>
             </a:fld>
             <a:endParaRPr lang="ru-RU"/>
           </a:p>
@@ -4028,7 +4028,7 @@
           <a:p>
             <a:fld id="{1953C272-8C72-41F6-9C12-11750B48D95E}" type="slidenum">
               <a:rPr lang="ru-RU" smtClean="0"/>
-              <a:t>‹№›</a:t>
+              <a:t>‹#›</a:t>
             </a:fld>
             <a:endParaRPr lang="ru-RU"/>
           </a:p>
@@ -4280,7 +4280,7 @@
           <a:p>
             <a:fld id="{1953C272-8C72-41F6-9C12-11750B48D95E}" type="slidenum">
               <a:rPr lang="ru-RU" smtClean="0"/>
-              <a:t>‹№›</a:t>
+              <a:t>‹#›</a:t>
             </a:fld>
             <a:endParaRPr lang="ru-RU"/>
           </a:p>
@@ -4527,7 +4527,7 @@
           <a:p>
             <a:fld id="{1953C272-8C72-41F6-9C12-11750B48D95E}" type="slidenum">
               <a:rPr lang="ru-RU" smtClean="0"/>
-              <a:t>‹№›</a:t>
+              <a:t>‹#›</a:t>
             </a:fld>
             <a:endParaRPr lang="ru-RU"/>
           </a:p>
@@ -5541,6 +5541,20 @@
                 <a:cs typeface="Courier New" panose="02070309020205020404" pitchFamily="49" charset="0"/>
               </a:rPr>
             </a:br>
+            <a:r>
+              <a:rPr kumimoji="0" lang="en-US" altLang="en-US" sz="900" b="0" i="0" u="none" strike="noStrike" cap="none" normalizeH="0" baseline="0" dirty="0">
+                <a:ln>
+                  <a:noFill/>
+                </a:ln>
+                <a:solidFill>
+                  <a:srgbClr val="A9B7C6"/>
+                </a:solidFill>
+                <a:effectLst/>
+                <a:latin typeface="Courier New" panose="02070309020205020404" pitchFamily="49" charset="0"/>
+                <a:cs typeface="Courier New" panose="02070309020205020404" pitchFamily="49" charset="0"/>
+              </a:rPr>
+              <a:t/>
+            </a:r>
             <a:br>
               <a:rPr kumimoji="0" lang="en-US" altLang="en-US" sz="900" b="0" i="0" u="none" strike="noStrike" cap="none" normalizeH="0" baseline="0" dirty="0">
                 <a:ln>
@@ -6276,6 +6290,20 @@
                 <a:cs typeface="Courier New" panose="02070309020205020404" pitchFamily="49" charset="0"/>
               </a:rPr>
             </a:br>
+            <a:r>
+              <a:rPr kumimoji="0" lang="en-US" altLang="en-US" sz="900" b="0" i="0" u="none" strike="noStrike" cap="none" normalizeH="0" baseline="0" dirty="0">
+                <a:ln>
+                  <a:noFill/>
+                </a:ln>
+                <a:solidFill>
+                  <a:srgbClr val="A9B7C6"/>
+                </a:solidFill>
+                <a:effectLst/>
+                <a:latin typeface="Courier New" panose="02070309020205020404" pitchFamily="49" charset="0"/>
+                <a:cs typeface="Courier New" panose="02070309020205020404" pitchFamily="49" charset="0"/>
+              </a:rPr>
+              <a:t/>
+            </a:r>
             <a:br>
               <a:rPr kumimoji="0" lang="en-US" altLang="en-US" sz="900" b="0" i="0" u="none" strike="noStrike" cap="none" normalizeH="0" baseline="0" dirty="0">
                 <a:ln>
@@ -7053,6 +7081,20 @@
                 <a:cs typeface="Courier New" panose="02070309020205020404" pitchFamily="49" charset="0"/>
               </a:rPr>
             </a:br>
+            <a:r>
+              <a:rPr kumimoji="0" lang="en-US" altLang="en-US" sz="900" b="0" i="0" u="none" strike="noStrike" cap="none" normalizeH="0" baseline="0" dirty="0">
+                <a:ln>
+                  <a:noFill/>
+                </a:ln>
+                <a:solidFill>
+                  <a:srgbClr val="A9B7C6"/>
+                </a:solidFill>
+                <a:effectLst/>
+                <a:latin typeface="Courier New" panose="02070309020205020404" pitchFamily="49" charset="0"/>
+                <a:cs typeface="Courier New" panose="02070309020205020404" pitchFamily="49" charset="0"/>
+              </a:rPr>
+              <a:t/>
+            </a:r>
             <a:br>
               <a:rPr kumimoji="0" lang="en-US" altLang="en-US" sz="900" b="0" i="0" u="none" strike="noStrike" cap="none" normalizeH="0" baseline="0" dirty="0">
                 <a:ln>
@@ -7677,6 +7719,20 @@
                 <a:cs typeface="Courier New" panose="02070309020205020404" pitchFamily="49" charset="0"/>
               </a:rPr>
             </a:br>
+            <a:r>
+              <a:rPr kumimoji="0" lang="en-US" altLang="en-US" sz="900" b="0" i="0" u="none" strike="noStrike" cap="none" normalizeH="0" baseline="0" dirty="0">
+                <a:ln>
+                  <a:noFill/>
+                </a:ln>
+                <a:solidFill>
+                  <a:srgbClr val="A9B7C6"/>
+                </a:solidFill>
+                <a:effectLst/>
+                <a:latin typeface="Courier New" panose="02070309020205020404" pitchFamily="49" charset="0"/>
+                <a:cs typeface="Courier New" panose="02070309020205020404" pitchFamily="49" charset="0"/>
+              </a:rPr>
+              <a:t/>
+            </a:r>
             <a:br>
               <a:rPr kumimoji="0" lang="en-US" altLang="en-US" sz="900" b="0" i="0" u="none" strike="noStrike" cap="none" normalizeH="0" baseline="0" dirty="0">
                 <a:ln>
@@ -7856,6 +7912,20 @@
                 <a:cs typeface="Courier New" panose="02070309020205020404" pitchFamily="49" charset="0"/>
               </a:rPr>
               <a:t>ResponseBody</a:t>
+            </a:r>
+            <a:r>
+              <a:rPr kumimoji="0" lang="en-US" altLang="en-US" sz="900" b="0" i="0" u="none" strike="noStrike" cap="none" normalizeH="0" baseline="0" dirty="0">
+                <a:ln>
+                  <a:noFill/>
+                </a:ln>
+                <a:solidFill>
+                  <a:srgbClr val="BBB529"/>
+                </a:solidFill>
+                <a:effectLst/>
+                <a:latin typeface="Courier New" panose="02070309020205020404" pitchFamily="49" charset="0"/>
+                <a:cs typeface="Courier New" panose="02070309020205020404" pitchFamily="49" charset="0"/>
+              </a:rPr>
+              <a:t/>
             </a:r>
             <a:br>
               <a:rPr kumimoji="0" lang="en-US" altLang="en-US" sz="900" b="0" i="0" u="none" strike="noStrike" cap="none" normalizeH="0" baseline="0" dirty="0">
@@ -8310,6 +8380,20 @@
               </a:rPr>
               <a:t>RestController</a:t>
             </a:r>
+            <a:r>
+              <a:rPr kumimoji="0" lang="en-US" altLang="en-US" sz="800" b="0" i="0" u="none" strike="noStrike" cap="none" normalizeH="0" baseline="0" dirty="0">
+                <a:ln>
+                  <a:noFill/>
+                </a:ln>
+                <a:solidFill>
+                  <a:srgbClr val="BBB529"/>
+                </a:solidFill>
+                <a:effectLst/>
+                <a:latin typeface="Courier New" panose="02070309020205020404" pitchFamily="49" charset="0"/>
+                <a:cs typeface="Courier New" panose="02070309020205020404" pitchFamily="49" charset="0"/>
+              </a:rPr>
+              <a:t/>
+            </a:r>
             <a:br>
               <a:rPr kumimoji="0" lang="en-US" altLang="en-US" sz="800" b="0" i="0" u="none" strike="noStrike" cap="none" normalizeH="0" baseline="0" dirty="0">
                 <a:ln>
@@ -12047,7 +12131,12 @@
             <p:ph type="title"/>
           </p:nvPr>
         </p:nvSpPr>
-        <p:spPr/>
+        <p:spPr>
+          <a:xfrm>
+            <a:off x="838199" y="365125"/>
+            <a:ext cx="11107189" cy="1325563"/>
+          </a:xfrm>
+        </p:spPr>
         <p:txBody>
           <a:bodyPr>
             <a:normAutofit/>
@@ -12055,11 +12144,11 @@
           <a:lstStyle/>
           <a:p>
             <a:r>
-              <a:rPr lang="it-IT" sz="4000" dirty="0"/>
+              <a:rPr lang="it-IT" dirty="0"/>
               <a:t>Spring MVC. Controller: </a:t>
             </a:r>
             <a:r>
-              <a:rPr lang="en-US" sz="4000" dirty="0"/>
+              <a:rPr lang="en-US" dirty="0"/>
               <a:t>Detailed URL Mapping</a:t>
             </a:r>
           </a:p>
@@ -12346,7 +12435,7 @@
         <p:spPr/>
         <p:txBody>
           <a:bodyPr>
-            <a:normAutofit/>
+            <a:normAutofit lnSpcReduction="10000"/>
           </a:bodyPr>
           <a:lstStyle/>
           <a:p>
@@ -12513,18 +12602,18 @@
           <a:lstStyle/>
           <a:p>
             <a:r>
-              <a:rPr lang="it-IT" sz="4000" dirty="0"/>
+              <a:rPr lang="it-IT" dirty="0"/>
               <a:t>Spring MVC. Controller: </a:t>
             </a:r>
             <a:r>
-              <a:rPr lang="en-US" sz="4000" dirty="0"/>
+              <a:rPr lang="en-US" dirty="0"/>
               <a:t>@</a:t>
             </a:r>
             <a:r>
-              <a:rPr lang="en-US" sz="4000" dirty="0" err="1"/>
+              <a:rPr lang="en-US" dirty="0" err="1"/>
               <a:t>ModelAttribute</a:t>
             </a:r>
-            <a:endParaRPr lang="en-US" sz="4000" dirty="0"/>
+            <a:endParaRPr lang="en-US" dirty="0"/>
           </a:p>
         </p:txBody>
       </p:sp>
@@ -12669,7 +12758,7 @@
         <p:spPr/>
         <p:txBody>
           <a:bodyPr>
-            <a:normAutofit fontScale="92500"/>
+            <a:normAutofit fontScale="92500" lnSpcReduction="10000"/>
           </a:bodyPr>
           <a:lstStyle/>
           <a:p>
@@ -13874,6 +13963,20 @@
                 <a:cs typeface="Courier New" panose="02070309020205020404" pitchFamily="49" charset="0"/>
               </a:rPr>
             </a:br>
+            <a:r>
+              <a:rPr kumimoji="0" lang="en-US" altLang="en-US" sz="900" b="0" i="0" u="none" strike="noStrike" cap="none" normalizeH="0" baseline="0">
+                <a:ln>
+                  <a:noFill/>
+                </a:ln>
+                <a:solidFill>
+                  <a:srgbClr val="E8BF6A"/>
+                </a:solidFill>
+                <a:effectLst/>
+                <a:latin typeface="Courier New" panose="02070309020205020404" pitchFamily="49" charset="0"/>
+                <a:cs typeface="Courier New" panose="02070309020205020404" pitchFamily="49" charset="0"/>
+              </a:rPr>
+              <a:t/>
+            </a:r>
             <a:br>
               <a:rPr kumimoji="0" lang="en-US" altLang="en-US" sz="900" b="0" i="0" u="none" strike="noStrike" cap="none" normalizeH="0" baseline="0">
                 <a:ln>
@@ -14176,6 +14279,20 @@
                 <a:cs typeface="Courier New" panose="02070309020205020404" pitchFamily="49" charset="0"/>
               </a:rPr>
             </a:br>
+            <a:r>
+              <a:rPr kumimoji="0" lang="en-US" altLang="en-US" sz="900" b="0" i="0" u="none" strike="noStrike" cap="none" normalizeH="0" baseline="0">
+                <a:ln>
+                  <a:noFill/>
+                </a:ln>
+                <a:solidFill>
+                  <a:srgbClr val="E8BF6A"/>
+                </a:solidFill>
+                <a:effectLst/>
+                <a:latin typeface="Courier New" panose="02070309020205020404" pitchFamily="49" charset="0"/>
+                <a:cs typeface="Courier New" panose="02070309020205020404" pitchFamily="49" charset="0"/>
+              </a:rPr>
+              <a:t/>
+            </a:r>
             <a:br>
               <a:rPr kumimoji="0" lang="en-US" altLang="en-US" sz="900" b="0" i="0" u="none" strike="noStrike" cap="none" normalizeH="0" baseline="0">
                 <a:ln>
@@ -15227,6 +15344,20 @@
                 <a:cs typeface="Courier New" panose="02070309020205020404" pitchFamily="49" charset="0"/>
               </a:rPr>
             </a:br>
+            <a:r>
+              <a:rPr kumimoji="0" lang="en-US" altLang="en-US" sz="900" b="0" i="0" u="none" strike="noStrike" cap="none" normalizeH="0" baseline="0">
+                <a:ln>
+                  <a:noFill/>
+                </a:ln>
+                <a:solidFill>
+                  <a:srgbClr val="CC7832"/>
+                </a:solidFill>
+                <a:effectLst/>
+                <a:latin typeface="Courier New" panose="02070309020205020404" pitchFamily="49" charset="0"/>
+                <a:cs typeface="Courier New" panose="02070309020205020404" pitchFamily="49" charset="0"/>
+              </a:rPr>
+              <a:t/>
+            </a:r>
             <a:br>
               <a:rPr kumimoji="0" lang="en-US" altLang="en-US" sz="900" b="0" i="0" u="none" strike="noStrike" cap="none" normalizeH="0" baseline="0">
                 <a:ln>
@@ -15875,6 +16006,20 @@
                 <a:cs typeface="Courier New" panose="02070309020205020404" pitchFamily="49" charset="0"/>
               </a:rPr>
             </a:br>
+            <a:r>
+              <a:rPr kumimoji="0" lang="en-US" altLang="en-US" sz="900" b="0" i="0" u="none" strike="noStrike" cap="none" normalizeH="0" baseline="0">
+                <a:ln>
+                  <a:noFill/>
+                </a:ln>
+                <a:solidFill>
+                  <a:srgbClr val="A9B7C6"/>
+                </a:solidFill>
+                <a:effectLst/>
+                <a:latin typeface="Courier New" panose="02070309020205020404" pitchFamily="49" charset="0"/>
+                <a:cs typeface="Courier New" panose="02070309020205020404" pitchFamily="49" charset="0"/>
+              </a:rPr>
+              <a:t/>
+            </a:r>
             <a:br>
               <a:rPr kumimoji="0" lang="en-US" altLang="en-US" sz="900" b="0" i="0" u="none" strike="noStrike" cap="none" normalizeH="0" baseline="0">
                 <a:ln>
@@ -18015,6 +18160,20 @@
                 <a:cs typeface="Courier New" panose="02070309020205020404" pitchFamily="49" charset="0"/>
               </a:rPr>
             </a:br>
+            <a:r>
+              <a:rPr kumimoji="0" lang="en-US" altLang="en-US" sz="900" b="0" i="0" u="none" strike="noStrike" cap="none" normalizeH="0" baseline="0">
+                <a:ln>
+                  <a:noFill/>
+                </a:ln>
+                <a:solidFill>
+                  <a:srgbClr val="E8BF6A"/>
+                </a:solidFill>
+                <a:effectLst/>
+                <a:latin typeface="Courier New" panose="02070309020205020404" pitchFamily="49" charset="0"/>
+                <a:cs typeface="Courier New" panose="02070309020205020404" pitchFamily="49" charset="0"/>
+              </a:rPr>
+              <a:t/>
+            </a:r>
             <a:br>
               <a:rPr kumimoji="0" lang="en-US" altLang="en-US" sz="900" b="0" i="0" u="none" strike="noStrike" cap="none" normalizeH="0" baseline="0">
                 <a:ln>
@@ -18317,6 +18476,20 @@
                 <a:cs typeface="Courier New" panose="02070309020205020404" pitchFamily="49" charset="0"/>
               </a:rPr>
             </a:br>
+            <a:r>
+              <a:rPr kumimoji="0" lang="en-US" altLang="en-US" sz="900" b="0" i="0" u="none" strike="noStrike" cap="none" normalizeH="0" baseline="0">
+                <a:ln>
+                  <a:noFill/>
+                </a:ln>
+                <a:solidFill>
+                  <a:srgbClr val="E8BF6A"/>
+                </a:solidFill>
+                <a:effectLst/>
+                <a:latin typeface="Courier New" panose="02070309020205020404" pitchFamily="49" charset="0"/>
+                <a:cs typeface="Courier New" panose="02070309020205020404" pitchFamily="49" charset="0"/>
+              </a:rPr>
+              <a:t/>
+            </a:r>
             <a:br>
               <a:rPr kumimoji="0" lang="en-US" altLang="en-US" sz="900" b="0" i="0" u="none" strike="noStrike" cap="none" normalizeH="0" baseline="0">
                 <a:ln>
@@ -18537,6 +18710,20 @@
                 <a:cs typeface="Courier New" panose="02070309020205020404" pitchFamily="49" charset="0"/>
               </a:rPr>
             </a:br>
+            <a:r>
+              <a:rPr kumimoji="0" lang="en-US" altLang="en-US" sz="900" b="0" i="0" u="none" strike="noStrike" cap="none" normalizeH="0" baseline="0">
+                <a:ln>
+                  <a:noFill/>
+                </a:ln>
+                <a:solidFill>
+                  <a:srgbClr val="E8BF6A"/>
+                </a:solidFill>
+                <a:effectLst/>
+                <a:latin typeface="Courier New" panose="02070309020205020404" pitchFamily="49" charset="0"/>
+                <a:cs typeface="Courier New" panose="02070309020205020404" pitchFamily="49" charset="0"/>
+              </a:rPr>
+              <a:t/>
+            </a:r>
             <a:br>
               <a:rPr kumimoji="0" lang="en-US" altLang="en-US" sz="900" b="0" i="0" u="none" strike="noStrike" cap="none" normalizeH="0" baseline="0">
                 <a:ln>
@@ -19177,6 +19364,10 @@
           </p:nvPr>
         </p:nvSpPr>
         <p:spPr bwMode="auto">
+          <a:xfrm>
+            <a:off x="838200" y="2570130"/>
+            <a:ext cx="10661893" cy="2862322"/>
+          </a:xfrm>
           <a:prstGeom prst="rect">
             <a:avLst/>
           </a:prstGeom>
@@ -19235,7 +19426,7 @@
               <a:tabLst/>
             </a:pPr>
             <a:r>
-              <a:rPr kumimoji="0" lang="en-US" altLang="en-US" sz="900" b="0" i="0" u="none" strike="noStrike" cap="none" normalizeH="0" baseline="0">
+              <a:rPr kumimoji="0" lang="en-US" altLang="en-US" sz="1800" b="0" i="0" u="none" strike="noStrike" cap="none" normalizeH="0" baseline="0" dirty="0" smtClean="0">
                 <a:ln>
                   <a:noFill/>
                 </a:ln>
@@ -19246,10 +19437,24 @@
                 <a:latin typeface="Courier New" panose="02070309020205020404" pitchFamily="49" charset="0"/>
                 <a:cs typeface="Courier New" panose="02070309020205020404" pitchFamily="49" charset="0"/>
               </a:rPr>
-              <a:t>@ControllerAdvice</a:t>
-            </a:r>
-            <a:r>
-              <a:rPr kumimoji="0" lang="en-US" altLang="en-US" sz="900" b="0" i="0" u="none" strike="noStrike" cap="none" normalizeH="0" baseline="0">
+              <a:t>@</a:t>
+            </a:r>
+            <a:r>
+              <a:rPr kumimoji="0" lang="en-US" altLang="en-US" sz="1800" b="0" i="0" u="none" strike="noStrike" cap="none" normalizeH="0" baseline="0" dirty="0" err="1" smtClean="0">
+                <a:ln>
+                  <a:noFill/>
+                </a:ln>
+                <a:solidFill>
+                  <a:srgbClr val="BBB529"/>
+                </a:solidFill>
+                <a:effectLst/>
+                <a:latin typeface="Courier New" panose="02070309020205020404" pitchFamily="49" charset="0"/>
+                <a:cs typeface="Courier New" panose="02070309020205020404" pitchFamily="49" charset="0"/>
+              </a:rPr>
+              <a:t>ControllerAdvice</a:t>
+            </a:r>
+            <a:r>
+              <a:rPr kumimoji="0" lang="en-US" altLang="en-US" sz="1800" b="0" i="0" u="none" strike="noStrike" cap="none" normalizeH="0" baseline="0" dirty="0" smtClean="0">
                 <a:ln>
                   <a:noFill/>
                 </a:ln>
@@ -19263,7 +19468,7 @@
               <a:t>(</a:t>
             </a:r>
             <a:r>
-              <a:rPr kumimoji="0" lang="en-US" altLang="en-US" sz="900" b="0" i="0" u="none" strike="noStrike" cap="none" normalizeH="0" baseline="0">
+              <a:rPr kumimoji="0" lang="en-US" altLang="en-US" sz="1800" b="0" i="0" u="none" strike="noStrike" cap="none" normalizeH="0" baseline="0" dirty="0" err="1" smtClean="0">
                 <a:ln>
                   <a:noFill/>
                 </a:ln>
@@ -19274,24 +19479,52 @@
                 <a:latin typeface="Courier New" panose="02070309020205020404" pitchFamily="49" charset="0"/>
                 <a:cs typeface="Courier New" panose="02070309020205020404" pitchFamily="49" charset="0"/>
               </a:rPr>
-              <a:t>assignableTypes </a:t>
-            </a:r>
-            <a:r>
-              <a:rPr kumimoji="0" lang="en-US" altLang="en-US" sz="900" b="0" i="0" u="none" strike="noStrike" cap="none" normalizeH="0" baseline="0">
-                <a:ln>
-                  <a:noFill/>
-                </a:ln>
-                <a:solidFill>
-                  <a:srgbClr val="A9B7C6"/>
-                </a:solidFill>
-                <a:effectLst/>
-                <a:latin typeface="Courier New" panose="02070309020205020404" pitchFamily="49" charset="0"/>
-                <a:cs typeface="Courier New" panose="02070309020205020404" pitchFamily="49" charset="0"/>
-              </a:rPr>
-              <a:t>= HomeController.</a:t>
-            </a:r>
-            <a:r>
-              <a:rPr kumimoji="0" lang="en-US" altLang="en-US" sz="900" b="0" i="0" u="none" strike="noStrike" cap="none" normalizeH="0" baseline="0">
+              <a:t>assignableTypes</a:t>
+            </a:r>
+            <a:r>
+              <a:rPr kumimoji="0" lang="en-US" altLang="en-US" sz="1800" b="0" i="0" u="none" strike="noStrike" cap="none" normalizeH="0" baseline="0" dirty="0" smtClean="0">
+                <a:ln>
+                  <a:noFill/>
+                </a:ln>
+                <a:solidFill>
+                  <a:srgbClr val="D0D0FF"/>
+                </a:solidFill>
+                <a:effectLst/>
+                <a:latin typeface="Courier New" panose="02070309020205020404" pitchFamily="49" charset="0"/>
+                <a:cs typeface="Courier New" panose="02070309020205020404" pitchFamily="49" charset="0"/>
+              </a:rPr>
+              <a:t> </a:t>
+            </a:r>
+            <a:r>
+              <a:rPr kumimoji="0" lang="en-US" altLang="en-US" sz="1800" b="0" i="0" u="none" strike="noStrike" cap="none" normalizeH="0" baseline="0" dirty="0" smtClean="0">
+                <a:ln>
+                  <a:noFill/>
+                </a:ln>
+                <a:solidFill>
+                  <a:srgbClr val="A9B7C6"/>
+                </a:solidFill>
+                <a:effectLst/>
+                <a:latin typeface="Courier New" panose="02070309020205020404" pitchFamily="49" charset="0"/>
+                <a:cs typeface="Courier New" panose="02070309020205020404" pitchFamily="49" charset="0"/>
+              </a:rPr>
+              <a:t>= </a:t>
+            </a:r>
+            <a:r>
+              <a:rPr kumimoji="0" lang="en-US" altLang="en-US" sz="1800" b="0" i="0" u="none" strike="noStrike" cap="none" normalizeH="0" baseline="0" dirty="0" err="1" smtClean="0">
+                <a:ln>
+                  <a:noFill/>
+                </a:ln>
+                <a:solidFill>
+                  <a:srgbClr val="A9B7C6"/>
+                </a:solidFill>
+                <a:effectLst/>
+                <a:latin typeface="Courier New" panose="02070309020205020404" pitchFamily="49" charset="0"/>
+                <a:cs typeface="Courier New" panose="02070309020205020404" pitchFamily="49" charset="0"/>
+              </a:rPr>
+              <a:t>HomeController.</a:t>
+            </a:r>
+            <a:r>
+              <a:rPr kumimoji="0" lang="en-US" altLang="en-US" sz="1800" b="0" i="0" u="none" strike="noStrike" cap="none" normalizeH="0" baseline="0" dirty="0" err="1" smtClean="0">
                 <a:ln>
                   <a:noFill/>
                 </a:ln>
@@ -19305,7 +19538,7 @@
               <a:t>class</a:t>
             </a:r>
             <a:r>
-              <a:rPr kumimoji="0" lang="en-US" altLang="en-US" sz="900" b="0" i="0" u="none" strike="noStrike" cap="none" normalizeH="0" baseline="0">
+              <a:rPr kumimoji="0" lang="en-US" altLang="en-US" sz="1800" b="0" i="0" u="none" strike="noStrike" cap="none" normalizeH="0" baseline="0" dirty="0" smtClean="0">
                 <a:ln>
                   <a:noFill/>
                 </a:ln>
@@ -19319,7 +19552,7 @@
               <a:t>)</a:t>
             </a:r>
             <a:br>
-              <a:rPr kumimoji="0" lang="en-US" altLang="en-US" sz="900" b="0" i="0" u="none" strike="noStrike" cap="none" normalizeH="0" baseline="0">
+              <a:rPr kumimoji="0" lang="en-US" altLang="en-US" sz="1800" b="0" i="0" u="none" strike="noStrike" cap="none" normalizeH="0" baseline="0" dirty="0" smtClean="0">
                 <a:ln>
                   <a:noFill/>
                 </a:ln>
@@ -19332,7 +19565,7 @@
               </a:rPr>
             </a:br>
             <a:r>
-              <a:rPr kumimoji="0" lang="en-US" altLang="en-US" sz="900" b="0" i="0" u="none" strike="noStrike" cap="none" normalizeH="0" baseline="0">
+              <a:rPr kumimoji="0" lang="en-US" altLang="en-US" sz="1800" b="0" i="0" u="none" strike="noStrike" cap="none" normalizeH="0" baseline="0" dirty="0" smtClean="0">
                 <a:ln>
                   <a:noFill/>
                 </a:ln>
@@ -19346,21 +19579,35 @@
               <a:t>public class </a:t>
             </a:r>
             <a:r>
-              <a:rPr kumimoji="0" lang="en-US" altLang="en-US" sz="900" b="0" i="0" u="none" strike="noStrike" cap="none" normalizeH="0" baseline="0">
-                <a:ln>
-                  <a:noFill/>
-                </a:ln>
-                <a:solidFill>
-                  <a:srgbClr val="A9B7C6"/>
-                </a:solidFill>
-                <a:effectLst/>
-                <a:latin typeface="Courier New" panose="02070309020205020404" pitchFamily="49" charset="0"/>
-                <a:cs typeface="Courier New" panose="02070309020205020404" pitchFamily="49" charset="0"/>
-              </a:rPr>
-              <a:t>HomeControllerExceptionHandler {</a:t>
+              <a:rPr kumimoji="0" lang="en-US" altLang="en-US" sz="1800" b="0" i="0" u="none" strike="noStrike" cap="none" normalizeH="0" baseline="0" dirty="0" err="1" smtClean="0">
+                <a:ln>
+                  <a:noFill/>
+                </a:ln>
+                <a:solidFill>
+                  <a:srgbClr val="A9B7C6"/>
+                </a:solidFill>
+                <a:effectLst/>
+                <a:latin typeface="Courier New" panose="02070309020205020404" pitchFamily="49" charset="0"/>
+                <a:cs typeface="Courier New" panose="02070309020205020404" pitchFamily="49" charset="0"/>
+              </a:rPr>
+              <a:t>HomeControllerExceptionHandler</a:t>
+            </a:r>
+            <a:r>
+              <a:rPr kumimoji="0" lang="en-US" altLang="en-US" sz="1800" b="0" i="0" u="none" strike="noStrike" cap="none" normalizeH="0" baseline="0" dirty="0" smtClean="0">
+                <a:ln>
+                  <a:noFill/>
+                </a:ln>
+                <a:solidFill>
+                  <a:srgbClr val="A9B7C6"/>
+                </a:solidFill>
+                <a:effectLst/>
+                <a:latin typeface="Courier New" panose="02070309020205020404" pitchFamily="49" charset="0"/>
+                <a:cs typeface="Courier New" panose="02070309020205020404" pitchFamily="49" charset="0"/>
+              </a:rPr>
+              <a:t> {</a:t>
             </a:r>
             <a:br>
-              <a:rPr kumimoji="0" lang="en-US" altLang="en-US" sz="900" b="0" i="0" u="none" strike="noStrike" cap="none" normalizeH="0" baseline="0">
+              <a:rPr kumimoji="0" lang="en-US" altLang="en-US" sz="1800" b="0" i="0" u="none" strike="noStrike" cap="none" normalizeH="0" baseline="0" dirty="0" smtClean="0">
                 <a:ln>
                   <a:noFill/>
                 </a:ln>
@@ -19373,7 +19620,7 @@
               </a:rPr>
             </a:br>
             <a:r>
-              <a:rPr kumimoji="0" lang="en-US" altLang="en-US" sz="900" b="0" i="0" u="none" strike="noStrike" cap="none" normalizeH="0" baseline="0">
+              <a:rPr kumimoji="0" lang="en-US" altLang="en-US" sz="1800" b="0" i="0" u="none" strike="noStrike" cap="none" normalizeH="0" baseline="0" dirty="0" smtClean="0">
                 <a:ln>
                   <a:noFill/>
                 </a:ln>
@@ -19387,7 +19634,7 @@
               <a:t>    </a:t>
             </a:r>
             <a:r>
-              <a:rPr kumimoji="0" lang="en-US" altLang="en-US" sz="900" b="0" i="0" u="none" strike="noStrike" cap="none" normalizeH="0" baseline="0">
+              <a:rPr kumimoji="0" lang="en-US" altLang="en-US" sz="1800" b="0" i="0" u="none" strike="noStrike" cap="none" normalizeH="0" baseline="0" dirty="0" smtClean="0">
                 <a:ln>
                   <a:noFill/>
                 </a:ln>
@@ -19398,24 +19645,52 @@
                 <a:latin typeface="Courier New" panose="02070309020205020404" pitchFamily="49" charset="0"/>
                 <a:cs typeface="Courier New" panose="02070309020205020404" pitchFamily="49" charset="0"/>
               </a:rPr>
-              <a:t>@ResponseStatus</a:t>
-            </a:r>
-            <a:r>
-              <a:rPr kumimoji="0" lang="en-US" altLang="en-US" sz="900" b="0" i="0" u="none" strike="noStrike" cap="none" normalizeH="0" baseline="0">
-                <a:ln>
-                  <a:noFill/>
-                </a:ln>
-                <a:solidFill>
-                  <a:srgbClr val="A9B7C6"/>
-                </a:solidFill>
-                <a:effectLst/>
-                <a:latin typeface="Courier New" panose="02070309020205020404" pitchFamily="49" charset="0"/>
-                <a:cs typeface="Courier New" panose="02070309020205020404" pitchFamily="49" charset="0"/>
-              </a:rPr>
-              <a:t>(HttpStatus.</a:t>
-            </a:r>
-            <a:r>
-              <a:rPr kumimoji="0" lang="en-US" altLang="en-US" sz="900" b="0" i="1" u="none" strike="noStrike" cap="none" normalizeH="0" baseline="0">
+              <a:t>@</a:t>
+            </a:r>
+            <a:r>
+              <a:rPr kumimoji="0" lang="en-US" altLang="en-US" sz="1800" b="0" i="0" u="none" strike="noStrike" cap="none" normalizeH="0" baseline="0" dirty="0" err="1" smtClean="0">
+                <a:ln>
+                  <a:noFill/>
+                </a:ln>
+                <a:solidFill>
+                  <a:srgbClr val="BBB529"/>
+                </a:solidFill>
+                <a:effectLst/>
+                <a:latin typeface="Courier New" panose="02070309020205020404" pitchFamily="49" charset="0"/>
+                <a:cs typeface="Courier New" panose="02070309020205020404" pitchFamily="49" charset="0"/>
+              </a:rPr>
+              <a:t>ResponseStatus</a:t>
+            </a:r>
+            <a:r>
+              <a:rPr kumimoji="0" lang="en-US" altLang="en-US" sz="1800" b="0" i="0" u="none" strike="noStrike" cap="none" normalizeH="0" baseline="0" dirty="0" smtClean="0">
+                <a:ln>
+                  <a:noFill/>
+                </a:ln>
+                <a:solidFill>
+                  <a:srgbClr val="A9B7C6"/>
+                </a:solidFill>
+                <a:effectLst/>
+                <a:latin typeface="Courier New" panose="02070309020205020404" pitchFamily="49" charset="0"/>
+                <a:cs typeface="Courier New" panose="02070309020205020404" pitchFamily="49" charset="0"/>
+              </a:rPr>
+              <a:t>(</a:t>
+            </a:r>
+            <a:r>
+              <a:rPr kumimoji="0" lang="en-US" altLang="en-US" sz="1800" b="0" i="0" u="none" strike="noStrike" cap="none" normalizeH="0" baseline="0" dirty="0" err="1" smtClean="0">
+                <a:ln>
+                  <a:noFill/>
+                </a:ln>
+                <a:solidFill>
+                  <a:srgbClr val="A9B7C6"/>
+                </a:solidFill>
+                <a:effectLst/>
+                <a:latin typeface="Courier New" panose="02070309020205020404" pitchFamily="49" charset="0"/>
+                <a:cs typeface="Courier New" panose="02070309020205020404" pitchFamily="49" charset="0"/>
+              </a:rPr>
+              <a:t>HttpStatus.</a:t>
+            </a:r>
+            <a:r>
+              <a:rPr kumimoji="0" lang="en-US" altLang="en-US" sz="1800" b="0" i="1" u="none" strike="noStrike" cap="none" normalizeH="0" baseline="0" dirty="0" err="1" smtClean="0">
                 <a:ln>
                   <a:noFill/>
                 </a:ln>
@@ -19429,7 +19704,7 @@
               <a:t>INTERNAL_SERVER_ERROR</a:t>
             </a:r>
             <a:r>
-              <a:rPr kumimoji="0" lang="en-US" altLang="en-US" sz="900" b="0" i="0" u="none" strike="noStrike" cap="none" normalizeH="0" baseline="0">
+              <a:rPr kumimoji="0" lang="en-US" altLang="en-US" sz="1800" b="0" i="0" u="none" strike="noStrike" cap="none" normalizeH="0" baseline="0" dirty="0" smtClean="0">
                 <a:ln>
                   <a:noFill/>
                 </a:ln>
@@ -19443,7 +19718,7 @@
               <a:t>)</a:t>
             </a:r>
             <a:br>
-              <a:rPr kumimoji="0" lang="en-US" altLang="en-US" sz="900" b="0" i="0" u="none" strike="noStrike" cap="none" normalizeH="0" baseline="0">
+              <a:rPr kumimoji="0" lang="en-US" altLang="en-US" sz="1800" b="0" i="0" u="none" strike="noStrike" cap="none" normalizeH="0" baseline="0" dirty="0" smtClean="0">
                 <a:ln>
                   <a:noFill/>
                 </a:ln>
@@ -19456,7 +19731,7 @@
               </a:rPr>
             </a:br>
             <a:r>
-              <a:rPr kumimoji="0" lang="en-US" altLang="en-US" sz="900" b="0" i="0" u="none" strike="noStrike" cap="none" normalizeH="0" baseline="0">
+              <a:rPr kumimoji="0" lang="en-US" altLang="en-US" sz="1800" b="0" i="0" u="none" strike="noStrike" cap="none" normalizeH="0" baseline="0" dirty="0" smtClean="0">
                 <a:ln>
                   <a:noFill/>
                 </a:ln>
@@ -19470,7 +19745,7 @@
               <a:t>    </a:t>
             </a:r>
             <a:r>
-              <a:rPr kumimoji="0" lang="en-US" altLang="en-US" sz="900" b="0" i="0" u="none" strike="noStrike" cap="none" normalizeH="0" baseline="0">
+              <a:rPr kumimoji="0" lang="en-US" altLang="en-US" sz="1800" b="0" i="0" u="none" strike="noStrike" cap="none" normalizeH="0" baseline="0" dirty="0" smtClean="0">
                 <a:ln>
                   <a:noFill/>
                 </a:ln>
@@ -19481,24 +19756,52 @@
                 <a:latin typeface="Courier New" panose="02070309020205020404" pitchFamily="49" charset="0"/>
                 <a:cs typeface="Courier New" panose="02070309020205020404" pitchFamily="49" charset="0"/>
               </a:rPr>
-              <a:t>@ExceptionHandler</a:t>
-            </a:r>
-            <a:r>
-              <a:rPr kumimoji="0" lang="en-US" altLang="en-US" sz="900" b="0" i="0" u="none" strike="noStrike" cap="none" normalizeH="0" baseline="0">
-                <a:ln>
-                  <a:noFill/>
-                </a:ln>
-                <a:solidFill>
-                  <a:srgbClr val="A9B7C6"/>
-                </a:solidFill>
-                <a:effectLst/>
-                <a:latin typeface="Courier New" panose="02070309020205020404" pitchFamily="49" charset="0"/>
-                <a:cs typeface="Courier New" panose="02070309020205020404" pitchFamily="49" charset="0"/>
-              </a:rPr>
-              <a:t>({FileNotFoundException.</a:t>
-            </a:r>
-            <a:r>
-              <a:rPr kumimoji="0" lang="en-US" altLang="en-US" sz="900" b="0" i="0" u="none" strike="noStrike" cap="none" normalizeH="0" baseline="0">
+              <a:t>@</a:t>
+            </a:r>
+            <a:r>
+              <a:rPr kumimoji="0" lang="en-US" altLang="en-US" sz="1800" b="0" i="0" u="none" strike="noStrike" cap="none" normalizeH="0" baseline="0" dirty="0" err="1" smtClean="0">
+                <a:ln>
+                  <a:noFill/>
+                </a:ln>
+                <a:solidFill>
+                  <a:srgbClr val="BBB529"/>
+                </a:solidFill>
+                <a:effectLst/>
+                <a:latin typeface="Courier New" panose="02070309020205020404" pitchFamily="49" charset="0"/>
+                <a:cs typeface="Courier New" panose="02070309020205020404" pitchFamily="49" charset="0"/>
+              </a:rPr>
+              <a:t>ExceptionHandler</a:t>
+            </a:r>
+            <a:r>
+              <a:rPr kumimoji="0" lang="en-US" altLang="en-US" sz="1800" b="0" i="0" u="none" strike="noStrike" cap="none" normalizeH="0" baseline="0" dirty="0" smtClean="0">
+                <a:ln>
+                  <a:noFill/>
+                </a:ln>
+                <a:solidFill>
+                  <a:srgbClr val="A9B7C6"/>
+                </a:solidFill>
+                <a:effectLst/>
+                <a:latin typeface="Courier New" panose="02070309020205020404" pitchFamily="49" charset="0"/>
+                <a:cs typeface="Courier New" panose="02070309020205020404" pitchFamily="49" charset="0"/>
+              </a:rPr>
+              <a:t>({</a:t>
+            </a:r>
+            <a:r>
+              <a:rPr kumimoji="0" lang="en-US" altLang="en-US" sz="1800" b="0" i="0" u="none" strike="noStrike" cap="none" normalizeH="0" baseline="0" dirty="0" err="1" smtClean="0">
+                <a:ln>
+                  <a:noFill/>
+                </a:ln>
+                <a:solidFill>
+                  <a:srgbClr val="A9B7C6"/>
+                </a:solidFill>
+                <a:effectLst/>
+                <a:latin typeface="Courier New" panose="02070309020205020404" pitchFamily="49" charset="0"/>
+                <a:cs typeface="Courier New" panose="02070309020205020404" pitchFamily="49" charset="0"/>
+              </a:rPr>
+              <a:t>FileNotFoundException.</a:t>
+            </a:r>
+            <a:r>
+              <a:rPr kumimoji="0" lang="en-US" altLang="en-US" sz="1800" b="0" i="0" u="none" strike="noStrike" cap="none" normalizeH="0" baseline="0" dirty="0" err="1" smtClean="0">
                 <a:ln>
                   <a:noFill/>
                 </a:ln>
@@ -19509,10 +19812,24 @@
                 <a:latin typeface="Courier New" panose="02070309020205020404" pitchFamily="49" charset="0"/>
                 <a:cs typeface="Courier New" panose="02070309020205020404" pitchFamily="49" charset="0"/>
               </a:rPr>
-              <a:t>class, </a:t>
-            </a:r>
-            <a:r>
-              <a:rPr kumimoji="0" lang="en-US" altLang="en-US" sz="900" b="0" i="0" u="none" strike="noStrike" cap="none" normalizeH="0" baseline="0">
+              <a:t>class</a:t>
+            </a:r>
+            <a:r>
+              <a:rPr kumimoji="0" lang="en-US" altLang="en-US" sz="1800" b="0" i="0" u="none" strike="noStrike" cap="none" normalizeH="0" baseline="0" dirty="0" smtClean="0">
+                <a:ln>
+                  <a:noFill/>
+                </a:ln>
+                <a:solidFill>
+                  <a:srgbClr val="CC7832"/>
+                </a:solidFill>
+                <a:effectLst/>
+                <a:latin typeface="Courier New" panose="02070309020205020404" pitchFamily="49" charset="0"/>
+                <a:cs typeface="Courier New" panose="02070309020205020404" pitchFamily="49" charset="0"/>
+              </a:rPr>
+              <a:t>, </a:t>
+            </a:r>
+            <a:r>
+              <a:rPr kumimoji="0" lang="en-US" altLang="en-US" sz="1800" b="0" i="0" u="none" strike="noStrike" cap="none" normalizeH="0" baseline="0" dirty="0" err="1" smtClean="0">
                 <a:ln>
                   <a:noFill/>
                 </a:ln>
@@ -19526,7 +19843,7 @@
               <a:t>RuntimeException.</a:t>
             </a:r>
             <a:r>
-              <a:rPr kumimoji="0" lang="en-US" altLang="en-US" sz="900" b="0" i="0" u="none" strike="noStrike" cap="none" normalizeH="0" baseline="0">
+              <a:rPr kumimoji="0" lang="en-US" altLang="en-US" sz="1800" b="0" i="0" u="none" strike="noStrike" cap="none" normalizeH="0" baseline="0" dirty="0" err="1" smtClean="0">
                 <a:ln>
                   <a:noFill/>
                 </a:ln>
@@ -19540,7 +19857,7 @@
               <a:t>class</a:t>
             </a:r>
             <a:r>
-              <a:rPr kumimoji="0" lang="en-US" altLang="en-US" sz="900" b="0" i="0" u="none" strike="noStrike" cap="none" normalizeH="0" baseline="0">
+              <a:rPr kumimoji="0" lang="en-US" altLang="en-US" sz="1800" b="0" i="0" u="none" strike="noStrike" cap="none" normalizeH="0" baseline="0" dirty="0" smtClean="0">
                 <a:ln>
                   <a:noFill/>
                 </a:ln>
@@ -19554,7 +19871,7 @@
               <a:t>})</a:t>
             </a:r>
             <a:br>
-              <a:rPr kumimoji="0" lang="en-US" altLang="en-US" sz="900" b="0" i="0" u="none" strike="noStrike" cap="none" normalizeH="0" baseline="0">
+              <a:rPr kumimoji="0" lang="en-US" altLang="en-US" sz="1800" b="0" i="0" u="none" strike="noStrike" cap="none" normalizeH="0" baseline="0" dirty="0" smtClean="0">
                 <a:ln>
                   <a:noFill/>
                 </a:ln>
@@ -19567,7 +19884,7 @@
               </a:rPr>
             </a:br>
             <a:r>
-              <a:rPr kumimoji="0" lang="en-US" altLang="en-US" sz="900" b="0" i="0" u="none" strike="noStrike" cap="none" normalizeH="0" baseline="0">
+              <a:rPr kumimoji="0" lang="en-US" altLang="en-US" sz="1800" b="0" i="0" u="none" strike="noStrike" cap="none" normalizeH="0" baseline="0" dirty="0" smtClean="0">
                 <a:ln>
                   <a:noFill/>
                 </a:ln>
@@ -19581,7 +19898,7 @@
               <a:t>    </a:t>
             </a:r>
             <a:r>
-              <a:rPr kumimoji="0" lang="en-US" altLang="en-US" sz="900" b="0" i="0" u="none" strike="noStrike" cap="none" normalizeH="0" baseline="0">
+              <a:rPr kumimoji="0" lang="en-US" altLang="en-US" sz="1800" b="0" i="0" u="none" strike="noStrike" cap="none" normalizeH="0" baseline="0" dirty="0" smtClean="0">
                 <a:ln>
                   <a:noFill/>
                 </a:ln>
@@ -19595,21 +19912,35 @@
               <a:t>public </a:t>
             </a:r>
             <a:r>
-              <a:rPr kumimoji="0" lang="en-US" altLang="en-US" sz="900" b="0" i="0" u="none" strike="noStrike" cap="none" normalizeH="0" baseline="0">
-                <a:ln>
-                  <a:noFill/>
-                </a:ln>
-                <a:solidFill>
-                  <a:srgbClr val="A9B7C6"/>
-                </a:solidFill>
-                <a:effectLst/>
-                <a:latin typeface="Courier New" panose="02070309020205020404" pitchFamily="49" charset="0"/>
-                <a:cs typeface="Courier New" panose="02070309020205020404" pitchFamily="49" charset="0"/>
-              </a:rPr>
-              <a:t>ModelAndView </a:t>
-            </a:r>
-            <a:r>
-              <a:rPr kumimoji="0" lang="en-US" altLang="en-US" sz="900" b="0" i="0" u="none" strike="noStrike" cap="none" normalizeH="0" baseline="0">
+              <a:rPr kumimoji="0" lang="en-US" altLang="en-US" sz="1800" b="0" i="0" u="none" strike="noStrike" cap="none" normalizeH="0" baseline="0" dirty="0" err="1" smtClean="0">
+                <a:ln>
+                  <a:noFill/>
+                </a:ln>
+                <a:solidFill>
+                  <a:srgbClr val="A9B7C6"/>
+                </a:solidFill>
+                <a:effectLst/>
+                <a:latin typeface="Courier New" panose="02070309020205020404" pitchFamily="49" charset="0"/>
+                <a:cs typeface="Courier New" panose="02070309020205020404" pitchFamily="49" charset="0"/>
+              </a:rPr>
+              <a:t>ModelAndView</a:t>
+            </a:r>
+            <a:r>
+              <a:rPr kumimoji="0" lang="en-US" altLang="en-US" sz="1800" b="0" i="0" u="none" strike="noStrike" cap="none" normalizeH="0" baseline="0" dirty="0" smtClean="0">
+                <a:ln>
+                  <a:noFill/>
+                </a:ln>
+                <a:solidFill>
+                  <a:srgbClr val="A9B7C6"/>
+                </a:solidFill>
+                <a:effectLst/>
+                <a:latin typeface="Courier New" panose="02070309020205020404" pitchFamily="49" charset="0"/>
+                <a:cs typeface="Courier New" panose="02070309020205020404" pitchFamily="49" charset="0"/>
+              </a:rPr>
+              <a:t> </a:t>
+            </a:r>
+            <a:r>
+              <a:rPr kumimoji="0" lang="en-US" altLang="en-US" sz="1800" b="0" i="0" u="none" strike="noStrike" cap="none" normalizeH="0" baseline="0" dirty="0" err="1" smtClean="0">
                 <a:ln>
                   <a:noFill/>
                 </a:ln>
@@ -19623,7 +19954,7 @@
               <a:t>exceptionHandler</a:t>
             </a:r>
             <a:r>
-              <a:rPr kumimoji="0" lang="en-US" altLang="en-US" sz="900" b="0" i="0" u="none" strike="noStrike" cap="none" normalizeH="0" baseline="0">
+              <a:rPr kumimoji="0" lang="en-US" altLang="en-US" sz="1800" b="0" i="0" u="none" strike="noStrike" cap="none" normalizeH="0" baseline="0" dirty="0" smtClean="0">
                 <a:ln>
                   <a:noFill/>
                 </a:ln>
@@ -19637,7 +19968,7 @@
               <a:t>(Exception ex) {</a:t>
             </a:r>
             <a:br>
-              <a:rPr kumimoji="0" lang="en-US" altLang="en-US" sz="900" b="0" i="0" u="none" strike="noStrike" cap="none" normalizeH="0" baseline="0">
+              <a:rPr kumimoji="0" lang="en-US" altLang="en-US" sz="1800" b="0" i="0" u="none" strike="noStrike" cap="none" normalizeH="0" baseline="0" dirty="0" smtClean="0">
                 <a:ln>
                   <a:noFill/>
                 </a:ln>
@@ -19650,21 +19981,77 @@
               </a:rPr>
             </a:br>
             <a:r>
-              <a:rPr kumimoji="0" lang="en-US" altLang="en-US" sz="900" b="0" i="0" u="none" strike="noStrike" cap="none" normalizeH="0" baseline="0">
-                <a:ln>
-                  <a:noFill/>
-                </a:ln>
-                <a:solidFill>
-                  <a:srgbClr val="A9B7C6"/>
-                </a:solidFill>
-                <a:effectLst/>
-                <a:latin typeface="Courier New" panose="02070309020205020404" pitchFamily="49" charset="0"/>
-                <a:cs typeface="Courier New" panose="02070309020205020404" pitchFamily="49" charset="0"/>
-              </a:rPr>
-              <a:t>        ModelAndView mav = </a:t>
-            </a:r>
-            <a:r>
-              <a:rPr kumimoji="0" lang="en-US" altLang="en-US" sz="900" b="0" i="0" u="none" strike="noStrike" cap="none" normalizeH="0" baseline="0">
+              <a:rPr kumimoji="0" lang="en-US" altLang="en-US" sz="1800" b="0" i="0" u="none" strike="noStrike" cap="none" normalizeH="0" baseline="0" dirty="0" smtClean="0">
+                <a:ln>
+                  <a:noFill/>
+                </a:ln>
+                <a:solidFill>
+                  <a:srgbClr val="A9B7C6"/>
+                </a:solidFill>
+                <a:effectLst/>
+                <a:latin typeface="Courier New" panose="02070309020205020404" pitchFamily="49" charset="0"/>
+                <a:cs typeface="Courier New" panose="02070309020205020404" pitchFamily="49" charset="0"/>
+              </a:rPr>
+              <a:t>        </a:t>
+            </a:r>
+            <a:r>
+              <a:rPr kumimoji="0" lang="en-US" altLang="en-US" sz="1800" b="0" i="0" u="none" strike="noStrike" cap="none" normalizeH="0" baseline="0" dirty="0" err="1" smtClean="0">
+                <a:ln>
+                  <a:noFill/>
+                </a:ln>
+                <a:solidFill>
+                  <a:srgbClr val="A9B7C6"/>
+                </a:solidFill>
+                <a:effectLst/>
+                <a:latin typeface="Courier New" panose="02070309020205020404" pitchFamily="49" charset="0"/>
+                <a:cs typeface="Courier New" panose="02070309020205020404" pitchFamily="49" charset="0"/>
+              </a:rPr>
+              <a:t>ModelAndView</a:t>
+            </a:r>
+            <a:r>
+              <a:rPr kumimoji="0" lang="en-US" altLang="en-US" sz="1800" b="0" i="0" u="none" strike="noStrike" cap="none" normalizeH="0" baseline="0" dirty="0" smtClean="0">
+                <a:ln>
+                  <a:noFill/>
+                </a:ln>
+                <a:solidFill>
+                  <a:srgbClr val="A9B7C6"/>
+                </a:solidFill>
+                <a:effectLst/>
+                <a:latin typeface="Courier New" panose="02070309020205020404" pitchFamily="49" charset="0"/>
+                <a:cs typeface="Courier New" panose="02070309020205020404" pitchFamily="49" charset="0"/>
+              </a:rPr>
+              <a:t> </a:t>
+            </a:r>
+            <a:r>
+              <a:rPr kumimoji="0" lang="en-US" altLang="en-US" sz="1800" b="0" i="0" u="none" strike="noStrike" cap="none" normalizeH="0" baseline="0" dirty="0" err="1" smtClean="0">
+                <a:ln>
+                  <a:noFill/>
+                </a:ln>
+                <a:solidFill>
+                  <a:srgbClr val="A9B7C6"/>
+                </a:solidFill>
+                <a:effectLst/>
+                <a:latin typeface="Courier New" panose="02070309020205020404" pitchFamily="49" charset="0"/>
+                <a:cs typeface="Courier New" panose="02070309020205020404" pitchFamily="49" charset="0"/>
+              </a:rPr>
+              <a:t>mav</a:t>
+            </a:r>
+            <a:r>
+              <a:rPr kumimoji="0" lang="en-US" altLang="en-US" sz="1800" b="0" i="0" u="none" strike="noStrike" cap="none" normalizeH="0" baseline="0" dirty="0" smtClean="0">
+                <a:ln>
+                  <a:noFill/>
+                </a:ln>
+                <a:solidFill>
+                  <a:srgbClr val="A9B7C6"/>
+                </a:solidFill>
+                <a:effectLst/>
+                <a:latin typeface="Courier New" panose="02070309020205020404" pitchFamily="49" charset="0"/>
+                <a:cs typeface="Courier New" panose="02070309020205020404" pitchFamily="49" charset="0"/>
+              </a:rPr>
+              <a:t> = </a:t>
+            </a:r>
+            <a:r>
+              <a:rPr kumimoji="0" lang="en-US" altLang="en-US" sz="1800" b="0" i="0" u="none" strike="noStrike" cap="none" normalizeH="0" baseline="0" dirty="0" smtClean="0">
                 <a:ln>
                   <a:noFill/>
                 </a:ln>
@@ -19678,21 +20065,35 @@
               <a:t>new </a:t>
             </a:r>
             <a:r>
-              <a:rPr kumimoji="0" lang="en-US" altLang="en-US" sz="900" b="0" i="0" u="none" strike="noStrike" cap="none" normalizeH="0" baseline="0">
-                <a:ln>
-                  <a:noFill/>
-                </a:ln>
-                <a:solidFill>
-                  <a:srgbClr val="A9B7C6"/>
-                </a:solidFill>
-                <a:effectLst/>
-                <a:latin typeface="Courier New" panose="02070309020205020404" pitchFamily="49" charset="0"/>
-                <a:cs typeface="Courier New" panose="02070309020205020404" pitchFamily="49" charset="0"/>
-              </a:rPr>
-              <a:t>ModelAndView(</a:t>
-            </a:r>
-            <a:r>
-              <a:rPr kumimoji="0" lang="en-US" altLang="en-US" sz="900" b="0" i="0" u="none" strike="noStrike" cap="none" normalizeH="0" baseline="0">
+              <a:rPr kumimoji="0" lang="en-US" altLang="en-US" sz="1800" b="0" i="0" u="none" strike="noStrike" cap="none" normalizeH="0" baseline="0" dirty="0" err="1" smtClean="0">
+                <a:ln>
+                  <a:noFill/>
+                </a:ln>
+                <a:solidFill>
+                  <a:srgbClr val="A9B7C6"/>
+                </a:solidFill>
+                <a:effectLst/>
+                <a:latin typeface="Courier New" panose="02070309020205020404" pitchFamily="49" charset="0"/>
+                <a:cs typeface="Courier New" panose="02070309020205020404" pitchFamily="49" charset="0"/>
+              </a:rPr>
+              <a:t>ModelAndView</a:t>
+            </a:r>
+            <a:r>
+              <a:rPr kumimoji="0" lang="en-US" altLang="en-US" sz="1800" b="0" i="0" u="none" strike="noStrike" cap="none" normalizeH="0" baseline="0" dirty="0" smtClean="0">
+                <a:ln>
+                  <a:noFill/>
+                </a:ln>
+                <a:solidFill>
+                  <a:srgbClr val="A9B7C6"/>
+                </a:solidFill>
+                <a:effectLst/>
+                <a:latin typeface="Courier New" panose="02070309020205020404" pitchFamily="49" charset="0"/>
+                <a:cs typeface="Courier New" panose="02070309020205020404" pitchFamily="49" charset="0"/>
+              </a:rPr>
+              <a:t>(</a:t>
+            </a:r>
+            <a:r>
+              <a:rPr kumimoji="0" lang="en-US" altLang="en-US" sz="1800" b="0" i="0" u="none" strike="noStrike" cap="none" normalizeH="0" baseline="0" dirty="0" smtClean="0">
                 <a:ln>
                   <a:noFill/>
                 </a:ln>
@@ -19703,10 +20104,38 @@
                 <a:latin typeface="Courier New" panose="02070309020205020404" pitchFamily="49" charset="0"/>
                 <a:cs typeface="Courier New" panose="02070309020205020404" pitchFamily="49" charset="0"/>
               </a:rPr>
-              <a:t>"serviceException"</a:t>
-            </a:r>
-            <a:r>
-              <a:rPr kumimoji="0" lang="en-US" altLang="en-US" sz="900" b="0" i="0" u="none" strike="noStrike" cap="none" normalizeH="0" baseline="0">
+              <a:t>"</a:t>
+            </a:r>
+            <a:r>
+              <a:rPr kumimoji="0" lang="en-US" altLang="en-US" sz="1800" b="0" i="0" u="none" strike="noStrike" cap="none" normalizeH="0" baseline="0" dirty="0" err="1" smtClean="0">
+                <a:ln>
+                  <a:noFill/>
+                </a:ln>
+                <a:solidFill>
+                  <a:srgbClr val="6A8759"/>
+                </a:solidFill>
+                <a:effectLst/>
+                <a:latin typeface="Courier New" panose="02070309020205020404" pitchFamily="49" charset="0"/>
+                <a:cs typeface="Courier New" panose="02070309020205020404" pitchFamily="49" charset="0"/>
+              </a:rPr>
+              <a:t>serviceException</a:t>
+            </a:r>
+            <a:r>
+              <a:rPr kumimoji="0" lang="en-US" altLang="en-US" sz="1800" b="0" i="0" u="none" strike="noStrike" cap="none" normalizeH="0" baseline="0" dirty="0" smtClean="0">
+                <a:ln>
+                  <a:noFill/>
+                </a:ln>
+                <a:solidFill>
+                  <a:srgbClr val="6A8759"/>
+                </a:solidFill>
+                <a:effectLst/>
+                <a:latin typeface="Courier New" panose="02070309020205020404" pitchFamily="49" charset="0"/>
+                <a:cs typeface="Courier New" panose="02070309020205020404" pitchFamily="49" charset="0"/>
+              </a:rPr>
+              <a:t>"</a:t>
+            </a:r>
+            <a:r>
+              <a:rPr kumimoji="0" lang="en-US" altLang="en-US" sz="1800" b="0" i="0" u="none" strike="noStrike" cap="none" normalizeH="0" baseline="0" dirty="0" smtClean="0">
                 <a:ln>
                   <a:noFill/>
                 </a:ln>
@@ -19720,7 +20149,7 @@
               <a:t>)</a:t>
             </a:r>
             <a:r>
-              <a:rPr kumimoji="0" lang="en-US" altLang="en-US" sz="900" b="0" i="0" u="none" strike="noStrike" cap="none" normalizeH="0" baseline="0">
+              <a:rPr kumimoji="0" lang="en-US" altLang="en-US" sz="1800" b="0" i="0" u="none" strike="noStrike" cap="none" normalizeH="0" baseline="0" dirty="0" smtClean="0">
                 <a:ln>
                   <a:noFill/>
                 </a:ln>
@@ -19734,7 +20163,7 @@
               <a:t>;</a:t>
             </a:r>
             <a:br>
-              <a:rPr kumimoji="0" lang="en-US" altLang="en-US" sz="900" b="0" i="0" u="none" strike="noStrike" cap="none" normalizeH="0" baseline="0">
+              <a:rPr kumimoji="0" lang="en-US" altLang="en-US" sz="1800" b="0" i="0" u="none" strike="noStrike" cap="none" normalizeH="0" baseline="0" dirty="0" smtClean="0">
                 <a:ln>
                   <a:noFill/>
                 </a:ln>
@@ -19747,7 +20176,7 @@
               </a:rPr>
             </a:br>
             <a:r>
-              <a:rPr kumimoji="0" lang="en-US" altLang="en-US" sz="900" b="0" i="0" u="none" strike="noStrike" cap="none" normalizeH="0" baseline="0">
+              <a:rPr kumimoji="0" lang="en-US" altLang="en-US" sz="1800" b="0" i="0" u="none" strike="noStrike" cap="none" normalizeH="0" baseline="0" dirty="0" smtClean="0">
                 <a:ln>
                   <a:noFill/>
                 </a:ln>
@@ -19761,21 +20190,35 @@
               <a:t>        </a:t>
             </a:r>
             <a:r>
-              <a:rPr kumimoji="0" lang="en-US" altLang="en-US" sz="900" b="0" i="0" u="none" strike="noStrike" cap="none" normalizeH="0" baseline="0">
-                <a:ln>
-                  <a:noFill/>
-                </a:ln>
-                <a:solidFill>
-                  <a:srgbClr val="A9B7C6"/>
-                </a:solidFill>
-                <a:effectLst/>
-                <a:latin typeface="Courier New" panose="02070309020205020404" pitchFamily="49" charset="0"/>
-                <a:cs typeface="Courier New" panose="02070309020205020404" pitchFamily="49" charset="0"/>
-              </a:rPr>
-              <a:t>mav.addObject(</a:t>
-            </a:r>
-            <a:r>
-              <a:rPr kumimoji="0" lang="en-US" altLang="en-US" sz="900" b="0" i="0" u="none" strike="noStrike" cap="none" normalizeH="0" baseline="0">
+              <a:rPr kumimoji="0" lang="en-US" altLang="en-US" sz="1800" b="0" i="0" u="none" strike="noStrike" cap="none" normalizeH="0" baseline="0" dirty="0" err="1" smtClean="0">
+                <a:ln>
+                  <a:noFill/>
+                </a:ln>
+                <a:solidFill>
+                  <a:srgbClr val="A9B7C6"/>
+                </a:solidFill>
+                <a:effectLst/>
+                <a:latin typeface="Courier New" panose="02070309020205020404" pitchFamily="49" charset="0"/>
+                <a:cs typeface="Courier New" panose="02070309020205020404" pitchFamily="49" charset="0"/>
+              </a:rPr>
+              <a:t>mav.addObject</a:t>
+            </a:r>
+            <a:r>
+              <a:rPr kumimoji="0" lang="en-US" altLang="en-US" sz="1800" b="0" i="0" u="none" strike="noStrike" cap="none" normalizeH="0" baseline="0" dirty="0" smtClean="0">
+                <a:ln>
+                  <a:noFill/>
+                </a:ln>
+                <a:solidFill>
+                  <a:srgbClr val="A9B7C6"/>
+                </a:solidFill>
+                <a:effectLst/>
+                <a:latin typeface="Courier New" panose="02070309020205020404" pitchFamily="49" charset="0"/>
+                <a:cs typeface="Courier New" panose="02070309020205020404" pitchFamily="49" charset="0"/>
+              </a:rPr>
+              <a:t>(</a:t>
+            </a:r>
+            <a:r>
+              <a:rPr kumimoji="0" lang="en-US" altLang="en-US" sz="1800" b="0" i="0" u="none" strike="noStrike" cap="none" normalizeH="0" baseline="0" dirty="0" smtClean="0">
                 <a:ln>
                   <a:noFill/>
                 </a:ln>
@@ -19786,10 +20229,38 @@
                 <a:latin typeface="Courier New" panose="02070309020205020404" pitchFamily="49" charset="0"/>
                 <a:cs typeface="Courier New" panose="02070309020205020404" pitchFamily="49" charset="0"/>
               </a:rPr>
-              <a:t>"errorMessage"</a:t>
-            </a:r>
-            <a:r>
-              <a:rPr kumimoji="0" lang="en-US" altLang="en-US" sz="900" b="0" i="0" u="none" strike="noStrike" cap="none" normalizeH="0" baseline="0">
+              <a:t>"</a:t>
+            </a:r>
+            <a:r>
+              <a:rPr kumimoji="0" lang="en-US" altLang="en-US" sz="1800" b="0" i="0" u="none" strike="noStrike" cap="none" normalizeH="0" baseline="0" dirty="0" err="1" smtClean="0">
+                <a:ln>
+                  <a:noFill/>
+                </a:ln>
+                <a:solidFill>
+                  <a:srgbClr val="6A8759"/>
+                </a:solidFill>
+                <a:effectLst/>
+                <a:latin typeface="Courier New" panose="02070309020205020404" pitchFamily="49" charset="0"/>
+                <a:cs typeface="Courier New" panose="02070309020205020404" pitchFamily="49" charset="0"/>
+              </a:rPr>
+              <a:t>errorMessage</a:t>
+            </a:r>
+            <a:r>
+              <a:rPr kumimoji="0" lang="en-US" altLang="en-US" sz="1800" b="0" i="0" u="none" strike="noStrike" cap="none" normalizeH="0" baseline="0" dirty="0" smtClean="0">
+                <a:ln>
+                  <a:noFill/>
+                </a:ln>
+                <a:solidFill>
+                  <a:srgbClr val="6A8759"/>
+                </a:solidFill>
+                <a:effectLst/>
+                <a:latin typeface="Courier New" panose="02070309020205020404" pitchFamily="49" charset="0"/>
+                <a:cs typeface="Courier New" panose="02070309020205020404" pitchFamily="49" charset="0"/>
+              </a:rPr>
+              <a:t>"</a:t>
+            </a:r>
+            <a:r>
+              <a:rPr kumimoji="0" lang="en-US" altLang="en-US" sz="1800" b="0" i="0" u="none" strike="noStrike" cap="none" normalizeH="0" baseline="0" dirty="0" smtClean="0">
                 <a:ln>
                   <a:noFill/>
                 </a:ln>
@@ -19803,7 +20274,7 @@
               <a:t>, </a:t>
             </a:r>
             <a:r>
-              <a:rPr kumimoji="0" lang="en-US" altLang="en-US" sz="900" b="0" i="0" u="none" strike="noStrike" cap="none" normalizeH="0" baseline="0">
+              <a:rPr kumimoji="0" lang="en-US" altLang="en-US" sz="1800" b="0" i="0" u="none" strike="noStrike" cap="none" normalizeH="0" baseline="0" dirty="0" smtClean="0">
                 <a:ln>
                   <a:noFill/>
                 </a:ln>
@@ -19817,21 +20288,49 @@
               <a:t>"Some Message. " </a:t>
             </a:r>
             <a:r>
-              <a:rPr kumimoji="0" lang="en-US" altLang="en-US" sz="900" b="0" i="0" u="none" strike="noStrike" cap="none" normalizeH="0" baseline="0">
-                <a:ln>
-                  <a:noFill/>
-                </a:ln>
-                <a:solidFill>
-                  <a:srgbClr val="A9B7C6"/>
-                </a:solidFill>
-                <a:effectLst/>
-                <a:latin typeface="Courier New" panose="02070309020205020404" pitchFamily="49" charset="0"/>
-                <a:cs typeface="Courier New" panose="02070309020205020404" pitchFamily="49" charset="0"/>
-              </a:rPr>
-              <a:t>+ ex.toString())</a:t>
-            </a:r>
-            <a:r>
-              <a:rPr kumimoji="0" lang="en-US" altLang="en-US" sz="900" b="0" i="0" u="none" strike="noStrike" cap="none" normalizeH="0" baseline="0">
+              <a:rPr kumimoji="0" lang="en-US" altLang="en-US" sz="1800" b="0" i="0" u="none" strike="noStrike" cap="none" normalizeH="0" baseline="0" dirty="0" smtClean="0">
+                <a:ln>
+                  <a:noFill/>
+                </a:ln>
+                <a:solidFill>
+                  <a:srgbClr val="A9B7C6"/>
+                </a:solidFill>
+                <a:effectLst/>
+                <a:latin typeface="Courier New" panose="02070309020205020404" pitchFamily="49" charset="0"/>
+                <a:cs typeface="Courier New" panose="02070309020205020404" pitchFamily="49" charset="0"/>
+              </a:rPr>
+              <a:t>+ </a:t>
+            </a:r>
+            <a:r>
+              <a:rPr kumimoji="0" lang="en-US" altLang="en-US" sz="1800" b="0" i="0" u="none" strike="noStrike" cap="none" normalizeH="0" baseline="0" dirty="0" err="1" smtClean="0">
+                <a:ln>
+                  <a:noFill/>
+                </a:ln>
+                <a:solidFill>
+                  <a:srgbClr val="A9B7C6"/>
+                </a:solidFill>
+                <a:effectLst/>
+                <a:latin typeface="Courier New" panose="02070309020205020404" pitchFamily="49" charset="0"/>
+                <a:cs typeface="Courier New" panose="02070309020205020404" pitchFamily="49" charset="0"/>
+              </a:rPr>
+              <a:t>ex.toString</a:t>
+            </a:r>
+            <a:r>
+              <a:rPr kumimoji="0" lang="en-US" altLang="en-US" sz="1800" b="0" i="0" u="none" strike="noStrike" cap="none" normalizeH="0" baseline="0" dirty="0" smtClean="0">
+                <a:ln>
+                  <a:noFill/>
+                </a:ln>
+                <a:solidFill>
+                  <a:srgbClr val="A9B7C6"/>
+                </a:solidFill>
+                <a:effectLst/>
+                <a:latin typeface="Courier New" panose="02070309020205020404" pitchFamily="49" charset="0"/>
+                <a:cs typeface="Courier New" panose="02070309020205020404" pitchFamily="49" charset="0"/>
+              </a:rPr>
+              <a:t>())</a:t>
+            </a:r>
+            <a:r>
+              <a:rPr kumimoji="0" lang="en-US" altLang="en-US" sz="1800" b="0" i="0" u="none" strike="noStrike" cap="none" normalizeH="0" baseline="0" dirty="0" smtClean="0">
                 <a:ln>
                   <a:noFill/>
                 </a:ln>
@@ -19845,7 +20344,7 @@
               <a:t>;</a:t>
             </a:r>
             <a:br>
-              <a:rPr kumimoji="0" lang="en-US" altLang="en-US" sz="900" b="0" i="0" u="none" strike="noStrike" cap="none" normalizeH="0" baseline="0">
+              <a:rPr kumimoji="0" lang="en-US" altLang="en-US" sz="1800" b="0" i="0" u="none" strike="noStrike" cap="none" normalizeH="0" baseline="0" dirty="0" smtClean="0">
                 <a:ln>
                   <a:noFill/>
                 </a:ln>
@@ -19858,7 +20357,7 @@
               </a:rPr>
             </a:br>
             <a:r>
-              <a:rPr kumimoji="0" lang="en-US" altLang="en-US" sz="900" b="0" i="0" u="none" strike="noStrike" cap="none" normalizeH="0" baseline="0">
+              <a:rPr kumimoji="0" lang="en-US" altLang="en-US" sz="1800" b="0" i="0" u="none" strike="noStrike" cap="none" normalizeH="0" baseline="0" dirty="0" smtClean="0">
                 <a:ln>
                   <a:noFill/>
                 </a:ln>
@@ -19872,7 +20371,7 @@
               <a:t>        return </a:t>
             </a:r>
             <a:r>
-              <a:rPr kumimoji="0" lang="en-US" altLang="en-US" sz="900" b="0" i="0" u="none" strike="noStrike" cap="none" normalizeH="0" baseline="0">
+              <a:rPr kumimoji="0" lang="en-US" altLang="en-US" sz="1800" b="0" i="0" u="none" strike="noStrike" cap="none" normalizeH="0" baseline="0" dirty="0" err="1" smtClean="0">
                 <a:ln>
                   <a:noFill/>
                 </a:ln>
@@ -19886,7 +20385,7 @@
               <a:t>mav</a:t>
             </a:r>
             <a:r>
-              <a:rPr kumimoji="0" lang="en-US" altLang="en-US" sz="900" b="0" i="0" u="none" strike="noStrike" cap="none" normalizeH="0" baseline="0">
+              <a:rPr kumimoji="0" lang="en-US" altLang="en-US" sz="1800" b="0" i="0" u="none" strike="noStrike" cap="none" normalizeH="0" baseline="0" dirty="0" smtClean="0">
                 <a:ln>
                   <a:noFill/>
                 </a:ln>
@@ -19900,7 +20399,7 @@
               <a:t>;</a:t>
             </a:r>
             <a:br>
-              <a:rPr kumimoji="0" lang="en-US" altLang="en-US" sz="900" b="0" i="0" u="none" strike="noStrike" cap="none" normalizeH="0" baseline="0">
+              <a:rPr kumimoji="0" lang="en-US" altLang="en-US" sz="1800" b="0" i="0" u="none" strike="noStrike" cap="none" normalizeH="0" baseline="0" dirty="0" smtClean="0">
                 <a:ln>
                   <a:noFill/>
                 </a:ln>
@@ -19913,7 +20412,7 @@
               </a:rPr>
             </a:br>
             <a:r>
-              <a:rPr kumimoji="0" lang="en-US" altLang="en-US" sz="900" b="0" i="0" u="none" strike="noStrike" cap="none" normalizeH="0" baseline="0">
+              <a:rPr kumimoji="0" lang="en-US" altLang="en-US" sz="1800" b="0" i="0" u="none" strike="noStrike" cap="none" normalizeH="0" baseline="0" dirty="0" smtClean="0">
                 <a:ln>
                   <a:noFill/>
                 </a:ln>
@@ -19927,7 +20426,7 @@
               <a:t>    </a:t>
             </a:r>
             <a:r>
-              <a:rPr kumimoji="0" lang="en-US" altLang="en-US" sz="900" b="0" i="0" u="none" strike="noStrike" cap="none" normalizeH="0" baseline="0">
+              <a:rPr kumimoji="0" lang="en-US" altLang="en-US" sz="1800" b="0" i="0" u="none" strike="noStrike" cap="none" normalizeH="0" baseline="0" dirty="0" smtClean="0">
                 <a:ln>
                   <a:noFill/>
                 </a:ln>
@@ -19941,7 +20440,7 @@
               <a:t>}</a:t>
             </a:r>
             <a:br>
-              <a:rPr kumimoji="0" lang="en-US" altLang="en-US" sz="900" b="0" i="0" u="none" strike="noStrike" cap="none" normalizeH="0" baseline="0">
+              <a:rPr kumimoji="0" lang="en-US" altLang="en-US" sz="1800" b="0" i="0" u="none" strike="noStrike" cap="none" normalizeH="0" baseline="0" dirty="0" smtClean="0">
                 <a:ln>
                   <a:noFill/>
                 </a:ln>
@@ -19954,7 +20453,7 @@
               </a:rPr>
             </a:br>
             <a:r>
-              <a:rPr kumimoji="0" lang="en-US" altLang="en-US" sz="900" b="0" i="0" u="none" strike="noStrike" cap="none" normalizeH="0" baseline="0">
+              <a:rPr kumimoji="0" lang="en-US" altLang="en-US" sz="1800" b="0" i="0" u="none" strike="noStrike" cap="none" normalizeH="0" baseline="0" dirty="0" smtClean="0">
                 <a:ln>
                   <a:noFill/>
                 </a:ln>
@@ -19967,7 +20466,7 @@
               </a:rPr>
               <a:t>}</a:t>
             </a:r>
-            <a:endParaRPr kumimoji="0" lang="en-US" altLang="en-US" sz="1800" b="0" i="0" u="none" strike="noStrike" cap="none" normalizeH="0" baseline="0">
+            <a:endParaRPr kumimoji="0" lang="en-US" altLang="en-US" sz="1800" b="0" i="0" u="none" strike="noStrike" cap="none" normalizeH="0" baseline="0" dirty="0">
               <a:ln>
                 <a:noFill/>
               </a:ln>
@@ -20050,6 +20549,10 @@
           </p:nvPr>
         </p:nvSpPr>
         <p:spPr bwMode="auto">
+          <a:xfrm>
+            <a:off x="838200" y="2570134"/>
+            <a:ext cx="10110460" cy="2862322"/>
+          </a:xfrm>
           <a:prstGeom prst="rect">
             <a:avLst/>
           </a:prstGeom>
@@ -20108,7 +20611,7 @@
               <a:tabLst/>
             </a:pPr>
             <a:r>
-              <a:rPr kumimoji="0" lang="en-US" altLang="en-US" sz="900" b="0" i="0" u="none" strike="noStrike" cap="none" normalizeH="0" baseline="0">
+              <a:rPr kumimoji="0" lang="en-US" altLang="en-US" sz="1800" b="0" i="0" u="none" strike="noStrike" cap="none" normalizeH="0" baseline="0" dirty="0">
                 <a:ln>
                   <a:noFill/>
                 </a:ln>
@@ -20119,10 +20622,24 @@
                 <a:latin typeface="Courier New" panose="02070309020205020404" pitchFamily="49" charset="0"/>
                 <a:cs typeface="Courier New" panose="02070309020205020404" pitchFamily="49" charset="0"/>
               </a:rPr>
-              <a:t>@ControllerAdvice</a:t>
-            </a:r>
-            <a:r>
-              <a:rPr kumimoji="0" lang="en-US" altLang="en-US" sz="900" b="0" i="0" u="none" strike="noStrike" cap="none" normalizeH="0" baseline="0">
+              <a:t>@</a:t>
+            </a:r>
+            <a:r>
+              <a:rPr kumimoji="0" lang="en-US" altLang="en-US" sz="1800" b="0" i="0" u="none" strike="noStrike" cap="none" normalizeH="0" baseline="0" dirty="0" err="1">
+                <a:ln>
+                  <a:noFill/>
+                </a:ln>
+                <a:solidFill>
+                  <a:srgbClr val="BBB529"/>
+                </a:solidFill>
+                <a:effectLst/>
+                <a:latin typeface="Courier New" panose="02070309020205020404" pitchFamily="49" charset="0"/>
+                <a:cs typeface="Courier New" panose="02070309020205020404" pitchFamily="49" charset="0"/>
+              </a:rPr>
+              <a:t>ControllerAdvice</a:t>
+            </a:r>
+            <a:r>
+              <a:rPr kumimoji="0" lang="en-US" altLang="en-US" sz="1800" b="0" i="0" u="none" strike="noStrike" cap="none" normalizeH="0" baseline="0" dirty="0">
                 <a:ln>
                   <a:noFill/>
                 </a:ln>
@@ -20136,7 +20653,7 @@
               <a:t>(</a:t>
             </a:r>
             <a:r>
-              <a:rPr kumimoji="0" lang="en-US" altLang="en-US" sz="900" b="0" i="0" u="none" strike="noStrike" cap="none" normalizeH="0" baseline="0">
+              <a:rPr kumimoji="0" lang="en-US" altLang="en-US" sz="1800" b="0" i="0" u="none" strike="noStrike" cap="none" normalizeH="0" baseline="0" dirty="0" err="1">
                 <a:ln>
                   <a:noFill/>
                 </a:ln>
@@ -20147,10 +20664,24 @@
                 <a:latin typeface="Courier New" panose="02070309020205020404" pitchFamily="49" charset="0"/>
                 <a:cs typeface="Courier New" panose="02070309020205020404" pitchFamily="49" charset="0"/>
               </a:rPr>
-              <a:t>basePackages </a:t>
-            </a:r>
-            <a:r>
-              <a:rPr kumimoji="0" lang="en-US" altLang="en-US" sz="900" b="0" i="0" u="none" strike="noStrike" cap="none" normalizeH="0" baseline="0">
+              <a:t>basePackages</a:t>
+            </a:r>
+            <a:r>
+              <a:rPr kumimoji="0" lang="en-US" altLang="en-US" sz="1800" b="0" i="0" u="none" strike="noStrike" cap="none" normalizeH="0" baseline="0" dirty="0">
+                <a:ln>
+                  <a:noFill/>
+                </a:ln>
+                <a:solidFill>
+                  <a:srgbClr val="D0D0FF"/>
+                </a:solidFill>
+                <a:effectLst/>
+                <a:latin typeface="Courier New" panose="02070309020205020404" pitchFamily="49" charset="0"/>
+                <a:cs typeface="Courier New" panose="02070309020205020404" pitchFamily="49" charset="0"/>
+              </a:rPr>
+              <a:t> </a:t>
+            </a:r>
+            <a:r>
+              <a:rPr kumimoji="0" lang="en-US" altLang="en-US" sz="1800" b="0" i="0" u="none" strike="noStrike" cap="none" normalizeH="0" baseline="0" dirty="0">
                 <a:ln>
                   <a:noFill/>
                 </a:ln>
@@ -20164,7 +20695,7 @@
               <a:t>= </a:t>
             </a:r>
             <a:r>
-              <a:rPr kumimoji="0" lang="en-US" altLang="en-US" sz="900" b="0" i="0" u="none" strike="noStrike" cap="none" normalizeH="0" baseline="0">
+              <a:rPr kumimoji="0" lang="en-US" altLang="en-US" sz="1800" b="0" i="0" u="none" strike="noStrike" cap="none" normalizeH="0" baseline="0" dirty="0">
                 <a:ln>
                   <a:noFill/>
                 </a:ln>
@@ -20178,7 +20709,7 @@
               <a:t>"org.geekhub.lesson16.springmvc"</a:t>
             </a:r>
             <a:r>
-              <a:rPr kumimoji="0" lang="en-US" altLang="en-US" sz="900" b="0" i="0" u="none" strike="noStrike" cap="none" normalizeH="0" baseline="0">
+              <a:rPr kumimoji="0" lang="en-US" altLang="en-US" sz="1800" b="0" i="0" u="none" strike="noStrike" cap="none" normalizeH="0" baseline="0" dirty="0">
                 <a:ln>
                   <a:noFill/>
                 </a:ln>
@@ -20192,7 +20723,7 @@
               <a:t>)</a:t>
             </a:r>
             <a:br>
-              <a:rPr kumimoji="0" lang="en-US" altLang="en-US" sz="900" b="0" i="0" u="none" strike="noStrike" cap="none" normalizeH="0" baseline="0">
+              <a:rPr kumimoji="0" lang="en-US" altLang="en-US" sz="1800" b="0" i="0" u="none" strike="noStrike" cap="none" normalizeH="0" baseline="0" dirty="0">
                 <a:ln>
                   <a:noFill/>
                 </a:ln>
@@ -20205,7 +20736,7 @@
               </a:rPr>
             </a:br>
             <a:r>
-              <a:rPr kumimoji="0" lang="en-US" altLang="en-US" sz="900" b="0" i="0" u="none" strike="noStrike" cap="none" normalizeH="0" baseline="0">
+              <a:rPr kumimoji="0" lang="en-US" altLang="en-US" sz="1800" b="0" i="0" u="none" strike="noStrike" cap="none" normalizeH="0" baseline="0" dirty="0">
                 <a:ln>
                   <a:noFill/>
                 </a:ln>
@@ -20219,21 +20750,35 @@
               <a:t>public class </a:t>
             </a:r>
             <a:r>
-              <a:rPr kumimoji="0" lang="en-US" altLang="en-US" sz="900" b="0" i="0" u="none" strike="noStrike" cap="none" normalizeH="0" baseline="0">
-                <a:ln>
-                  <a:noFill/>
-                </a:ln>
-                <a:solidFill>
-                  <a:srgbClr val="A9B7C6"/>
-                </a:solidFill>
-                <a:effectLst/>
-                <a:latin typeface="Courier New" panose="02070309020205020404" pitchFamily="49" charset="0"/>
-                <a:cs typeface="Courier New" panose="02070309020205020404" pitchFamily="49" charset="0"/>
-              </a:rPr>
-              <a:t>GlobalExceptionHandler {</a:t>
+              <a:rPr kumimoji="0" lang="en-US" altLang="en-US" sz="1800" b="0" i="0" u="none" strike="noStrike" cap="none" normalizeH="0" baseline="0" dirty="0" err="1">
+                <a:ln>
+                  <a:noFill/>
+                </a:ln>
+                <a:solidFill>
+                  <a:srgbClr val="A9B7C6"/>
+                </a:solidFill>
+                <a:effectLst/>
+                <a:latin typeface="Courier New" panose="02070309020205020404" pitchFamily="49" charset="0"/>
+                <a:cs typeface="Courier New" panose="02070309020205020404" pitchFamily="49" charset="0"/>
+              </a:rPr>
+              <a:t>GlobalExceptionHandler</a:t>
+            </a:r>
+            <a:r>
+              <a:rPr kumimoji="0" lang="en-US" altLang="en-US" sz="1800" b="0" i="0" u="none" strike="noStrike" cap="none" normalizeH="0" baseline="0" dirty="0">
+                <a:ln>
+                  <a:noFill/>
+                </a:ln>
+                <a:solidFill>
+                  <a:srgbClr val="A9B7C6"/>
+                </a:solidFill>
+                <a:effectLst/>
+                <a:latin typeface="Courier New" panose="02070309020205020404" pitchFamily="49" charset="0"/>
+                <a:cs typeface="Courier New" panose="02070309020205020404" pitchFamily="49" charset="0"/>
+              </a:rPr>
+              <a:t> {</a:t>
             </a:r>
             <a:br>
-              <a:rPr kumimoji="0" lang="en-US" altLang="en-US" sz="900" b="0" i="0" u="none" strike="noStrike" cap="none" normalizeH="0" baseline="0">
+              <a:rPr kumimoji="0" lang="en-US" altLang="en-US" sz="1800" b="0" i="0" u="none" strike="noStrike" cap="none" normalizeH="0" baseline="0" dirty="0">
                 <a:ln>
                   <a:noFill/>
                 </a:ln>
@@ -20246,7 +20791,7 @@
               </a:rPr>
             </a:br>
             <a:r>
-              <a:rPr kumimoji="0" lang="en-US" altLang="en-US" sz="900" b="0" i="0" u="none" strike="noStrike" cap="none" normalizeH="0" baseline="0">
+              <a:rPr kumimoji="0" lang="en-US" altLang="en-US" sz="1800" b="0" i="0" u="none" strike="noStrike" cap="none" normalizeH="0" baseline="0" dirty="0">
                 <a:ln>
                   <a:noFill/>
                 </a:ln>
@@ -20260,7 +20805,7 @@
               <a:t>    </a:t>
             </a:r>
             <a:r>
-              <a:rPr kumimoji="0" lang="en-US" altLang="en-US" sz="900" b="0" i="0" u="none" strike="noStrike" cap="none" normalizeH="0" baseline="0">
+              <a:rPr kumimoji="0" lang="en-US" altLang="en-US" sz="1800" b="0" i="0" u="none" strike="noStrike" cap="none" normalizeH="0" baseline="0" dirty="0">
                 <a:ln>
                   <a:noFill/>
                 </a:ln>
@@ -20271,24 +20816,52 @@
                 <a:latin typeface="Courier New" panose="02070309020205020404" pitchFamily="49" charset="0"/>
                 <a:cs typeface="Courier New" panose="02070309020205020404" pitchFamily="49" charset="0"/>
               </a:rPr>
-              <a:t>@ResponseStatus</a:t>
-            </a:r>
-            <a:r>
-              <a:rPr kumimoji="0" lang="en-US" altLang="en-US" sz="900" b="0" i="0" u="none" strike="noStrike" cap="none" normalizeH="0" baseline="0">
-                <a:ln>
-                  <a:noFill/>
-                </a:ln>
-                <a:solidFill>
-                  <a:srgbClr val="A9B7C6"/>
-                </a:solidFill>
-                <a:effectLst/>
-                <a:latin typeface="Courier New" panose="02070309020205020404" pitchFamily="49" charset="0"/>
-                <a:cs typeface="Courier New" panose="02070309020205020404" pitchFamily="49" charset="0"/>
-              </a:rPr>
-              <a:t>(HttpStatus.</a:t>
-            </a:r>
-            <a:r>
-              <a:rPr kumimoji="0" lang="en-US" altLang="en-US" sz="900" b="0" i="1" u="none" strike="noStrike" cap="none" normalizeH="0" baseline="0">
+              <a:t>@</a:t>
+            </a:r>
+            <a:r>
+              <a:rPr kumimoji="0" lang="en-US" altLang="en-US" sz="1800" b="0" i="0" u="none" strike="noStrike" cap="none" normalizeH="0" baseline="0" dirty="0" err="1">
+                <a:ln>
+                  <a:noFill/>
+                </a:ln>
+                <a:solidFill>
+                  <a:srgbClr val="BBB529"/>
+                </a:solidFill>
+                <a:effectLst/>
+                <a:latin typeface="Courier New" panose="02070309020205020404" pitchFamily="49" charset="0"/>
+                <a:cs typeface="Courier New" panose="02070309020205020404" pitchFamily="49" charset="0"/>
+              </a:rPr>
+              <a:t>ResponseStatus</a:t>
+            </a:r>
+            <a:r>
+              <a:rPr kumimoji="0" lang="en-US" altLang="en-US" sz="1800" b="0" i="0" u="none" strike="noStrike" cap="none" normalizeH="0" baseline="0" dirty="0">
+                <a:ln>
+                  <a:noFill/>
+                </a:ln>
+                <a:solidFill>
+                  <a:srgbClr val="A9B7C6"/>
+                </a:solidFill>
+                <a:effectLst/>
+                <a:latin typeface="Courier New" panose="02070309020205020404" pitchFamily="49" charset="0"/>
+                <a:cs typeface="Courier New" panose="02070309020205020404" pitchFamily="49" charset="0"/>
+              </a:rPr>
+              <a:t>(</a:t>
+            </a:r>
+            <a:r>
+              <a:rPr kumimoji="0" lang="en-US" altLang="en-US" sz="1800" b="0" i="0" u="none" strike="noStrike" cap="none" normalizeH="0" baseline="0" dirty="0" err="1">
+                <a:ln>
+                  <a:noFill/>
+                </a:ln>
+                <a:solidFill>
+                  <a:srgbClr val="A9B7C6"/>
+                </a:solidFill>
+                <a:effectLst/>
+                <a:latin typeface="Courier New" panose="02070309020205020404" pitchFamily="49" charset="0"/>
+                <a:cs typeface="Courier New" panose="02070309020205020404" pitchFamily="49" charset="0"/>
+              </a:rPr>
+              <a:t>HttpStatus.</a:t>
+            </a:r>
+            <a:r>
+              <a:rPr kumimoji="0" lang="en-US" altLang="en-US" sz="1800" b="0" i="1" u="none" strike="noStrike" cap="none" normalizeH="0" baseline="0" dirty="0" err="1">
                 <a:ln>
                   <a:noFill/>
                 </a:ln>
@@ -20302,7 +20875,7 @@
               <a:t>INTERNAL_SERVER_ERROR</a:t>
             </a:r>
             <a:r>
-              <a:rPr kumimoji="0" lang="en-US" altLang="en-US" sz="900" b="0" i="0" u="none" strike="noStrike" cap="none" normalizeH="0" baseline="0">
+              <a:rPr kumimoji="0" lang="en-US" altLang="en-US" sz="1800" b="0" i="0" u="none" strike="noStrike" cap="none" normalizeH="0" baseline="0" dirty="0">
                 <a:ln>
                   <a:noFill/>
                 </a:ln>
@@ -20316,7 +20889,7 @@
               <a:t>)</a:t>
             </a:r>
             <a:br>
-              <a:rPr kumimoji="0" lang="en-US" altLang="en-US" sz="900" b="0" i="0" u="none" strike="noStrike" cap="none" normalizeH="0" baseline="0">
+              <a:rPr kumimoji="0" lang="en-US" altLang="en-US" sz="1800" b="0" i="0" u="none" strike="noStrike" cap="none" normalizeH="0" baseline="0" dirty="0">
                 <a:ln>
                   <a:noFill/>
                 </a:ln>
@@ -20329,7 +20902,7 @@
               </a:rPr>
             </a:br>
             <a:r>
-              <a:rPr kumimoji="0" lang="en-US" altLang="en-US" sz="900" b="0" i="0" u="none" strike="noStrike" cap="none" normalizeH="0" baseline="0">
+              <a:rPr kumimoji="0" lang="en-US" altLang="en-US" sz="1800" b="0" i="0" u="none" strike="noStrike" cap="none" normalizeH="0" baseline="0" dirty="0">
                 <a:ln>
                   <a:noFill/>
                 </a:ln>
@@ -20343,7 +20916,7 @@
               <a:t>    </a:t>
             </a:r>
             <a:r>
-              <a:rPr kumimoji="0" lang="en-US" altLang="en-US" sz="900" b="0" i="0" u="none" strike="noStrike" cap="none" normalizeH="0" baseline="0">
+              <a:rPr kumimoji="0" lang="en-US" altLang="en-US" sz="1800" b="0" i="0" u="none" strike="noStrike" cap="none" normalizeH="0" baseline="0" dirty="0">
                 <a:ln>
                   <a:noFill/>
                 </a:ln>
@@ -20354,24 +20927,52 @@
                 <a:latin typeface="Courier New" panose="02070309020205020404" pitchFamily="49" charset="0"/>
                 <a:cs typeface="Courier New" panose="02070309020205020404" pitchFamily="49" charset="0"/>
               </a:rPr>
-              <a:t>@ExceptionHandler</a:t>
-            </a:r>
-            <a:r>
-              <a:rPr kumimoji="0" lang="en-US" altLang="en-US" sz="900" b="0" i="0" u="none" strike="noStrike" cap="none" normalizeH="0" baseline="0">
-                <a:ln>
-                  <a:noFill/>
-                </a:ln>
-                <a:solidFill>
-                  <a:srgbClr val="A9B7C6"/>
-                </a:solidFill>
-                <a:effectLst/>
-                <a:latin typeface="Courier New" panose="02070309020205020404" pitchFamily="49" charset="0"/>
-                <a:cs typeface="Courier New" panose="02070309020205020404" pitchFamily="49" charset="0"/>
-              </a:rPr>
-              <a:t>(Exception.</a:t>
-            </a:r>
-            <a:r>
-              <a:rPr kumimoji="0" lang="en-US" altLang="en-US" sz="900" b="0" i="0" u="none" strike="noStrike" cap="none" normalizeH="0" baseline="0">
+              <a:t>@</a:t>
+            </a:r>
+            <a:r>
+              <a:rPr kumimoji="0" lang="en-US" altLang="en-US" sz="1800" b="0" i="0" u="none" strike="noStrike" cap="none" normalizeH="0" baseline="0" dirty="0" err="1">
+                <a:ln>
+                  <a:noFill/>
+                </a:ln>
+                <a:solidFill>
+                  <a:srgbClr val="BBB529"/>
+                </a:solidFill>
+                <a:effectLst/>
+                <a:latin typeface="Courier New" panose="02070309020205020404" pitchFamily="49" charset="0"/>
+                <a:cs typeface="Courier New" panose="02070309020205020404" pitchFamily="49" charset="0"/>
+              </a:rPr>
+              <a:t>ExceptionHandler</a:t>
+            </a:r>
+            <a:r>
+              <a:rPr kumimoji="0" lang="en-US" altLang="en-US" sz="1800" b="0" i="0" u="none" strike="noStrike" cap="none" normalizeH="0" baseline="0" dirty="0">
+                <a:ln>
+                  <a:noFill/>
+                </a:ln>
+                <a:solidFill>
+                  <a:srgbClr val="A9B7C6"/>
+                </a:solidFill>
+                <a:effectLst/>
+                <a:latin typeface="Courier New" panose="02070309020205020404" pitchFamily="49" charset="0"/>
+                <a:cs typeface="Courier New" panose="02070309020205020404" pitchFamily="49" charset="0"/>
+              </a:rPr>
+              <a:t>(</a:t>
+            </a:r>
+            <a:r>
+              <a:rPr kumimoji="0" lang="en-US" altLang="en-US" sz="1800" b="0" i="0" u="none" strike="noStrike" cap="none" normalizeH="0" baseline="0" dirty="0" err="1">
+                <a:ln>
+                  <a:noFill/>
+                </a:ln>
+                <a:solidFill>
+                  <a:srgbClr val="A9B7C6"/>
+                </a:solidFill>
+                <a:effectLst/>
+                <a:latin typeface="Courier New" panose="02070309020205020404" pitchFamily="49" charset="0"/>
+                <a:cs typeface="Courier New" panose="02070309020205020404" pitchFamily="49" charset="0"/>
+              </a:rPr>
+              <a:t>Exception.</a:t>
+            </a:r>
+            <a:r>
+              <a:rPr kumimoji="0" lang="en-US" altLang="en-US" sz="1800" b="0" i="0" u="none" strike="noStrike" cap="none" normalizeH="0" baseline="0" dirty="0" err="1">
                 <a:ln>
                   <a:noFill/>
                 </a:ln>
@@ -20385,7 +20986,7 @@
               <a:t>class</a:t>
             </a:r>
             <a:r>
-              <a:rPr kumimoji="0" lang="en-US" altLang="en-US" sz="900" b="0" i="0" u="none" strike="noStrike" cap="none" normalizeH="0" baseline="0">
+              <a:rPr kumimoji="0" lang="en-US" altLang="en-US" sz="1800" b="0" i="0" u="none" strike="noStrike" cap="none" normalizeH="0" baseline="0" dirty="0">
                 <a:ln>
                   <a:noFill/>
                 </a:ln>
@@ -20399,7 +21000,7 @@
               <a:t>)</a:t>
             </a:r>
             <a:br>
-              <a:rPr kumimoji="0" lang="en-US" altLang="en-US" sz="900" b="0" i="0" u="none" strike="noStrike" cap="none" normalizeH="0" baseline="0">
+              <a:rPr kumimoji="0" lang="en-US" altLang="en-US" sz="1800" b="0" i="0" u="none" strike="noStrike" cap="none" normalizeH="0" baseline="0" dirty="0">
                 <a:ln>
                   <a:noFill/>
                 </a:ln>
@@ -20412,7 +21013,7 @@
               </a:rPr>
             </a:br>
             <a:r>
-              <a:rPr kumimoji="0" lang="en-US" altLang="en-US" sz="900" b="0" i="0" u="none" strike="noStrike" cap="none" normalizeH="0" baseline="0">
+              <a:rPr kumimoji="0" lang="en-US" altLang="en-US" sz="1800" b="0" i="0" u="none" strike="noStrike" cap="none" normalizeH="0" baseline="0" dirty="0">
                 <a:ln>
                   <a:noFill/>
                 </a:ln>
@@ -20426,7 +21027,7 @@
               <a:t>    </a:t>
             </a:r>
             <a:r>
-              <a:rPr kumimoji="0" lang="en-US" altLang="en-US" sz="900" b="0" i="0" u="none" strike="noStrike" cap="none" normalizeH="0" baseline="0">
+              <a:rPr kumimoji="0" lang="en-US" altLang="en-US" sz="1800" b="0" i="0" u="none" strike="noStrike" cap="none" normalizeH="0" baseline="0" dirty="0">
                 <a:ln>
                   <a:noFill/>
                 </a:ln>
@@ -20440,21 +21041,35 @@
               <a:t>public </a:t>
             </a:r>
             <a:r>
-              <a:rPr kumimoji="0" lang="en-US" altLang="en-US" sz="900" b="0" i="0" u="none" strike="noStrike" cap="none" normalizeH="0" baseline="0">
-                <a:ln>
-                  <a:noFill/>
-                </a:ln>
-                <a:solidFill>
-                  <a:srgbClr val="A9B7C6"/>
-                </a:solidFill>
-                <a:effectLst/>
-                <a:latin typeface="Courier New" panose="02070309020205020404" pitchFamily="49" charset="0"/>
-                <a:cs typeface="Courier New" panose="02070309020205020404" pitchFamily="49" charset="0"/>
-              </a:rPr>
-              <a:t>ModelAndView </a:t>
-            </a:r>
-            <a:r>
-              <a:rPr kumimoji="0" lang="en-US" altLang="en-US" sz="900" b="0" i="0" u="none" strike="noStrike" cap="none" normalizeH="0" baseline="0">
+              <a:rPr kumimoji="0" lang="en-US" altLang="en-US" sz="1800" b="0" i="0" u="none" strike="noStrike" cap="none" normalizeH="0" baseline="0" dirty="0" err="1">
+                <a:ln>
+                  <a:noFill/>
+                </a:ln>
+                <a:solidFill>
+                  <a:srgbClr val="A9B7C6"/>
+                </a:solidFill>
+                <a:effectLst/>
+                <a:latin typeface="Courier New" panose="02070309020205020404" pitchFamily="49" charset="0"/>
+                <a:cs typeface="Courier New" panose="02070309020205020404" pitchFamily="49" charset="0"/>
+              </a:rPr>
+              <a:t>ModelAndView</a:t>
+            </a:r>
+            <a:r>
+              <a:rPr kumimoji="0" lang="en-US" altLang="en-US" sz="1800" b="0" i="0" u="none" strike="noStrike" cap="none" normalizeH="0" baseline="0" dirty="0">
+                <a:ln>
+                  <a:noFill/>
+                </a:ln>
+                <a:solidFill>
+                  <a:srgbClr val="A9B7C6"/>
+                </a:solidFill>
+                <a:effectLst/>
+                <a:latin typeface="Courier New" panose="02070309020205020404" pitchFamily="49" charset="0"/>
+                <a:cs typeface="Courier New" panose="02070309020205020404" pitchFamily="49" charset="0"/>
+              </a:rPr>
+              <a:t> </a:t>
+            </a:r>
+            <a:r>
+              <a:rPr kumimoji="0" lang="en-US" altLang="en-US" sz="1800" b="0" i="0" u="none" strike="noStrike" cap="none" normalizeH="0" baseline="0" dirty="0" err="1">
                 <a:ln>
                   <a:noFill/>
                 </a:ln>
@@ -20468,7 +21083,7 @@
               <a:t>exceptionHandler</a:t>
             </a:r>
             <a:r>
-              <a:rPr kumimoji="0" lang="en-US" altLang="en-US" sz="900" b="0" i="0" u="none" strike="noStrike" cap="none" normalizeH="0" baseline="0">
+              <a:rPr kumimoji="0" lang="en-US" altLang="en-US" sz="1800" b="0" i="0" u="none" strike="noStrike" cap="none" normalizeH="0" baseline="0" dirty="0">
                 <a:ln>
                   <a:noFill/>
                 </a:ln>
@@ -20482,7 +21097,7 @@
               <a:t>(Exception ex) {</a:t>
             </a:r>
             <a:br>
-              <a:rPr kumimoji="0" lang="en-US" altLang="en-US" sz="900" b="0" i="0" u="none" strike="noStrike" cap="none" normalizeH="0" baseline="0">
+              <a:rPr kumimoji="0" lang="en-US" altLang="en-US" sz="1800" b="0" i="0" u="none" strike="noStrike" cap="none" normalizeH="0" baseline="0" dirty="0">
                 <a:ln>
                   <a:noFill/>
                 </a:ln>
@@ -20495,21 +21110,77 @@
               </a:rPr>
             </a:br>
             <a:r>
-              <a:rPr kumimoji="0" lang="en-US" altLang="en-US" sz="900" b="0" i="0" u="none" strike="noStrike" cap="none" normalizeH="0" baseline="0">
-                <a:ln>
-                  <a:noFill/>
-                </a:ln>
-                <a:solidFill>
-                  <a:srgbClr val="A9B7C6"/>
-                </a:solidFill>
-                <a:effectLst/>
-                <a:latin typeface="Courier New" panose="02070309020205020404" pitchFamily="49" charset="0"/>
-                <a:cs typeface="Courier New" panose="02070309020205020404" pitchFamily="49" charset="0"/>
-              </a:rPr>
-              <a:t>        ModelAndView mav = </a:t>
-            </a:r>
-            <a:r>
-              <a:rPr kumimoji="0" lang="en-US" altLang="en-US" sz="900" b="0" i="0" u="none" strike="noStrike" cap="none" normalizeH="0" baseline="0">
+              <a:rPr kumimoji="0" lang="en-US" altLang="en-US" sz="1800" b="0" i="0" u="none" strike="noStrike" cap="none" normalizeH="0" baseline="0" dirty="0">
+                <a:ln>
+                  <a:noFill/>
+                </a:ln>
+                <a:solidFill>
+                  <a:srgbClr val="A9B7C6"/>
+                </a:solidFill>
+                <a:effectLst/>
+                <a:latin typeface="Courier New" panose="02070309020205020404" pitchFamily="49" charset="0"/>
+                <a:cs typeface="Courier New" panose="02070309020205020404" pitchFamily="49" charset="0"/>
+              </a:rPr>
+              <a:t>        </a:t>
+            </a:r>
+            <a:r>
+              <a:rPr kumimoji="0" lang="en-US" altLang="en-US" sz="1800" b="0" i="0" u="none" strike="noStrike" cap="none" normalizeH="0" baseline="0" dirty="0" err="1">
+                <a:ln>
+                  <a:noFill/>
+                </a:ln>
+                <a:solidFill>
+                  <a:srgbClr val="A9B7C6"/>
+                </a:solidFill>
+                <a:effectLst/>
+                <a:latin typeface="Courier New" panose="02070309020205020404" pitchFamily="49" charset="0"/>
+                <a:cs typeface="Courier New" panose="02070309020205020404" pitchFamily="49" charset="0"/>
+              </a:rPr>
+              <a:t>ModelAndView</a:t>
+            </a:r>
+            <a:r>
+              <a:rPr kumimoji="0" lang="en-US" altLang="en-US" sz="1800" b="0" i="0" u="none" strike="noStrike" cap="none" normalizeH="0" baseline="0" dirty="0">
+                <a:ln>
+                  <a:noFill/>
+                </a:ln>
+                <a:solidFill>
+                  <a:srgbClr val="A9B7C6"/>
+                </a:solidFill>
+                <a:effectLst/>
+                <a:latin typeface="Courier New" panose="02070309020205020404" pitchFamily="49" charset="0"/>
+                <a:cs typeface="Courier New" panose="02070309020205020404" pitchFamily="49" charset="0"/>
+              </a:rPr>
+              <a:t> </a:t>
+            </a:r>
+            <a:r>
+              <a:rPr kumimoji="0" lang="en-US" altLang="en-US" sz="1800" b="0" i="0" u="none" strike="noStrike" cap="none" normalizeH="0" baseline="0" dirty="0" err="1">
+                <a:ln>
+                  <a:noFill/>
+                </a:ln>
+                <a:solidFill>
+                  <a:srgbClr val="A9B7C6"/>
+                </a:solidFill>
+                <a:effectLst/>
+                <a:latin typeface="Courier New" panose="02070309020205020404" pitchFamily="49" charset="0"/>
+                <a:cs typeface="Courier New" panose="02070309020205020404" pitchFamily="49" charset="0"/>
+              </a:rPr>
+              <a:t>mav</a:t>
+            </a:r>
+            <a:r>
+              <a:rPr kumimoji="0" lang="en-US" altLang="en-US" sz="1800" b="0" i="0" u="none" strike="noStrike" cap="none" normalizeH="0" baseline="0" dirty="0">
+                <a:ln>
+                  <a:noFill/>
+                </a:ln>
+                <a:solidFill>
+                  <a:srgbClr val="A9B7C6"/>
+                </a:solidFill>
+                <a:effectLst/>
+                <a:latin typeface="Courier New" panose="02070309020205020404" pitchFamily="49" charset="0"/>
+                <a:cs typeface="Courier New" panose="02070309020205020404" pitchFamily="49" charset="0"/>
+              </a:rPr>
+              <a:t> = </a:t>
+            </a:r>
+            <a:r>
+              <a:rPr kumimoji="0" lang="en-US" altLang="en-US" sz="1800" b="0" i="0" u="none" strike="noStrike" cap="none" normalizeH="0" baseline="0" dirty="0">
                 <a:ln>
                   <a:noFill/>
                 </a:ln>
@@ -20523,21 +21194,35 @@
               <a:t>new </a:t>
             </a:r>
             <a:r>
-              <a:rPr kumimoji="0" lang="en-US" altLang="en-US" sz="900" b="0" i="0" u="none" strike="noStrike" cap="none" normalizeH="0" baseline="0">
-                <a:ln>
-                  <a:noFill/>
-                </a:ln>
-                <a:solidFill>
-                  <a:srgbClr val="A9B7C6"/>
-                </a:solidFill>
-                <a:effectLst/>
-                <a:latin typeface="Courier New" panose="02070309020205020404" pitchFamily="49" charset="0"/>
-                <a:cs typeface="Courier New" panose="02070309020205020404" pitchFamily="49" charset="0"/>
-              </a:rPr>
-              <a:t>ModelAndView(</a:t>
-            </a:r>
-            <a:r>
-              <a:rPr kumimoji="0" lang="en-US" altLang="en-US" sz="900" b="0" i="0" u="none" strike="noStrike" cap="none" normalizeH="0" baseline="0">
+              <a:rPr kumimoji="0" lang="en-US" altLang="en-US" sz="1800" b="0" i="0" u="none" strike="noStrike" cap="none" normalizeH="0" baseline="0" dirty="0" err="1">
+                <a:ln>
+                  <a:noFill/>
+                </a:ln>
+                <a:solidFill>
+                  <a:srgbClr val="A9B7C6"/>
+                </a:solidFill>
+                <a:effectLst/>
+                <a:latin typeface="Courier New" panose="02070309020205020404" pitchFamily="49" charset="0"/>
+                <a:cs typeface="Courier New" panose="02070309020205020404" pitchFamily="49" charset="0"/>
+              </a:rPr>
+              <a:t>ModelAndView</a:t>
+            </a:r>
+            <a:r>
+              <a:rPr kumimoji="0" lang="en-US" altLang="en-US" sz="1800" b="0" i="0" u="none" strike="noStrike" cap="none" normalizeH="0" baseline="0" dirty="0">
+                <a:ln>
+                  <a:noFill/>
+                </a:ln>
+                <a:solidFill>
+                  <a:srgbClr val="A9B7C6"/>
+                </a:solidFill>
+                <a:effectLst/>
+                <a:latin typeface="Courier New" panose="02070309020205020404" pitchFamily="49" charset="0"/>
+                <a:cs typeface="Courier New" panose="02070309020205020404" pitchFamily="49" charset="0"/>
+              </a:rPr>
+              <a:t>(</a:t>
+            </a:r>
+            <a:r>
+              <a:rPr kumimoji="0" lang="en-US" altLang="en-US" sz="1800" b="0" i="0" u="none" strike="noStrike" cap="none" normalizeH="0" baseline="0" dirty="0">
                 <a:ln>
                   <a:noFill/>
                 </a:ln>
@@ -20548,10 +21233,38 @@
                 <a:latin typeface="Courier New" panose="02070309020205020404" pitchFamily="49" charset="0"/>
                 <a:cs typeface="Courier New" panose="02070309020205020404" pitchFamily="49" charset="0"/>
               </a:rPr>
-              <a:t>"serviceException"</a:t>
-            </a:r>
-            <a:r>
-              <a:rPr kumimoji="0" lang="en-US" altLang="en-US" sz="900" b="0" i="0" u="none" strike="noStrike" cap="none" normalizeH="0" baseline="0">
+              <a:t>"</a:t>
+            </a:r>
+            <a:r>
+              <a:rPr kumimoji="0" lang="en-US" altLang="en-US" sz="1800" b="0" i="0" u="none" strike="noStrike" cap="none" normalizeH="0" baseline="0" dirty="0" err="1">
+                <a:ln>
+                  <a:noFill/>
+                </a:ln>
+                <a:solidFill>
+                  <a:srgbClr val="6A8759"/>
+                </a:solidFill>
+                <a:effectLst/>
+                <a:latin typeface="Courier New" panose="02070309020205020404" pitchFamily="49" charset="0"/>
+                <a:cs typeface="Courier New" panose="02070309020205020404" pitchFamily="49" charset="0"/>
+              </a:rPr>
+              <a:t>serviceException</a:t>
+            </a:r>
+            <a:r>
+              <a:rPr kumimoji="0" lang="en-US" altLang="en-US" sz="1800" b="0" i="0" u="none" strike="noStrike" cap="none" normalizeH="0" baseline="0" dirty="0">
+                <a:ln>
+                  <a:noFill/>
+                </a:ln>
+                <a:solidFill>
+                  <a:srgbClr val="6A8759"/>
+                </a:solidFill>
+                <a:effectLst/>
+                <a:latin typeface="Courier New" panose="02070309020205020404" pitchFamily="49" charset="0"/>
+                <a:cs typeface="Courier New" panose="02070309020205020404" pitchFamily="49" charset="0"/>
+              </a:rPr>
+              <a:t>"</a:t>
+            </a:r>
+            <a:r>
+              <a:rPr kumimoji="0" lang="en-US" altLang="en-US" sz="1800" b="0" i="0" u="none" strike="noStrike" cap="none" normalizeH="0" baseline="0" dirty="0">
                 <a:ln>
                   <a:noFill/>
                 </a:ln>
@@ -20565,7 +21278,7 @@
               <a:t>)</a:t>
             </a:r>
             <a:r>
-              <a:rPr kumimoji="0" lang="en-US" altLang="en-US" sz="900" b="0" i="0" u="none" strike="noStrike" cap="none" normalizeH="0" baseline="0">
+              <a:rPr kumimoji="0" lang="en-US" altLang="en-US" sz="1800" b="0" i="0" u="none" strike="noStrike" cap="none" normalizeH="0" baseline="0" dirty="0">
                 <a:ln>
                   <a:noFill/>
                 </a:ln>
@@ -20579,7 +21292,7 @@
               <a:t>;</a:t>
             </a:r>
             <a:br>
-              <a:rPr kumimoji="0" lang="en-US" altLang="en-US" sz="900" b="0" i="0" u="none" strike="noStrike" cap="none" normalizeH="0" baseline="0">
+              <a:rPr kumimoji="0" lang="en-US" altLang="en-US" sz="1800" b="0" i="0" u="none" strike="noStrike" cap="none" normalizeH="0" baseline="0" dirty="0">
                 <a:ln>
                   <a:noFill/>
                 </a:ln>
@@ -20592,7 +21305,7 @@
               </a:rPr>
             </a:br>
             <a:r>
-              <a:rPr kumimoji="0" lang="en-US" altLang="en-US" sz="900" b="0" i="0" u="none" strike="noStrike" cap="none" normalizeH="0" baseline="0">
+              <a:rPr kumimoji="0" lang="en-US" altLang="en-US" sz="1800" b="0" i="0" u="none" strike="noStrike" cap="none" normalizeH="0" baseline="0" dirty="0">
                 <a:ln>
                   <a:noFill/>
                 </a:ln>
@@ -20606,21 +21319,35 @@
               <a:t>        </a:t>
             </a:r>
             <a:r>
-              <a:rPr kumimoji="0" lang="en-US" altLang="en-US" sz="900" b="0" i="0" u="none" strike="noStrike" cap="none" normalizeH="0" baseline="0">
-                <a:ln>
-                  <a:noFill/>
-                </a:ln>
-                <a:solidFill>
-                  <a:srgbClr val="A9B7C6"/>
-                </a:solidFill>
-                <a:effectLst/>
-                <a:latin typeface="Courier New" panose="02070309020205020404" pitchFamily="49" charset="0"/>
-                <a:cs typeface="Courier New" panose="02070309020205020404" pitchFamily="49" charset="0"/>
-              </a:rPr>
-              <a:t>mav.addObject(</a:t>
-            </a:r>
-            <a:r>
-              <a:rPr kumimoji="0" lang="en-US" altLang="en-US" sz="900" b="0" i="0" u="none" strike="noStrike" cap="none" normalizeH="0" baseline="0">
+              <a:rPr kumimoji="0" lang="en-US" altLang="en-US" sz="1800" b="0" i="0" u="none" strike="noStrike" cap="none" normalizeH="0" baseline="0" dirty="0" err="1">
+                <a:ln>
+                  <a:noFill/>
+                </a:ln>
+                <a:solidFill>
+                  <a:srgbClr val="A9B7C6"/>
+                </a:solidFill>
+                <a:effectLst/>
+                <a:latin typeface="Courier New" panose="02070309020205020404" pitchFamily="49" charset="0"/>
+                <a:cs typeface="Courier New" panose="02070309020205020404" pitchFamily="49" charset="0"/>
+              </a:rPr>
+              <a:t>mav.addObject</a:t>
+            </a:r>
+            <a:r>
+              <a:rPr kumimoji="0" lang="en-US" altLang="en-US" sz="1800" b="0" i="0" u="none" strike="noStrike" cap="none" normalizeH="0" baseline="0" dirty="0">
+                <a:ln>
+                  <a:noFill/>
+                </a:ln>
+                <a:solidFill>
+                  <a:srgbClr val="A9B7C6"/>
+                </a:solidFill>
+                <a:effectLst/>
+                <a:latin typeface="Courier New" panose="02070309020205020404" pitchFamily="49" charset="0"/>
+                <a:cs typeface="Courier New" panose="02070309020205020404" pitchFamily="49" charset="0"/>
+              </a:rPr>
+              <a:t>(</a:t>
+            </a:r>
+            <a:r>
+              <a:rPr kumimoji="0" lang="en-US" altLang="en-US" sz="1800" b="0" i="0" u="none" strike="noStrike" cap="none" normalizeH="0" baseline="0" dirty="0">
                 <a:ln>
                   <a:noFill/>
                 </a:ln>
@@ -20631,10 +21358,38 @@
                 <a:latin typeface="Courier New" panose="02070309020205020404" pitchFamily="49" charset="0"/>
                 <a:cs typeface="Courier New" panose="02070309020205020404" pitchFamily="49" charset="0"/>
               </a:rPr>
-              <a:t>"errorMessage"</a:t>
-            </a:r>
-            <a:r>
-              <a:rPr kumimoji="0" lang="en-US" altLang="en-US" sz="900" b="0" i="0" u="none" strike="noStrike" cap="none" normalizeH="0" baseline="0">
+              <a:t>"</a:t>
+            </a:r>
+            <a:r>
+              <a:rPr kumimoji="0" lang="en-US" altLang="en-US" sz="1800" b="0" i="0" u="none" strike="noStrike" cap="none" normalizeH="0" baseline="0" dirty="0" err="1">
+                <a:ln>
+                  <a:noFill/>
+                </a:ln>
+                <a:solidFill>
+                  <a:srgbClr val="6A8759"/>
+                </a:solidFill>
+                <a:effectLst/>
+                <a:latin typeface="Courier New" panose="02070309020205020404" pitchFamily="49" charset="0"/>
+                <a:cs typeface="Courier New" panose="02070309020205020404" pitchFamily="49" charset="0"/>
+              </a:rPr>
+              <a:t>errorMessage</a:t>
+            </a:r>
+            <a:r>
+              <a:rPr kumimoji="0" lang="en-US" altLang="en-US" sz="1800" b="0" i="0" u="none" strike="noStrike" cap="none" normalizeH="0" baseline="0" dirty="0">
+                <a:ln>
+                  <a:noFill/>
+                </a:ln>
+                <a:solidFill>
+                  <a:srgbClr val="6A8759"/>
+                </a:solidFill>
+                <a:effectLst/>
+                <a:latin typeface="Courier New" panose="02070309020205020404" pitchFamily="49" charset="0"/>
+                <a:cs typeface="Courier New" panose="02070309020205020404" pitchFamily="49" charset="0"/>
+              </a:rPr>
+              <a:t>"</a:t>
+            </a:r>
+            <a:r>
+              <a:rPr kumimoji="0" lang="en-US" altLang="en-US" sz="1800" b="0" i="0" u="none" strike="noStrike" cap="none" normalizeH="0" baseline="0" dirty="0">
                 <a:ln>
                   <a:noFill/>
                 </a:ln>
@@ -20648,7 +21403,7 @@
               <a:t>, </a:t>
             </a:r>
             <a:r>
-              <a:rPr kumimoji="0" lang="en-US" altLang="en-US" sz="900" b="0" i="0" u="none" strike="noStrike" cap="none" normalizeH="0" baseline="0">
+              <a:rPr kumimoji="0" lang="en-US" altLang="en-US" sz="1800" b="0" i="0" u="none" strike="noStrike" cap="none" normalizeH="0" baseline="0" dirty="0">
                 <a:ln>
                   <a:noFill/>
                 </a:ln>
@@ -20662,21 +21417,49 @@
               <a:t>"Some Message. " </a:t>
             </a:r>
             <a:r>
-              <a:rPr kumimoji="0" lang="en-US" altLang="en-US" sz="900" b="0" i="0" u="none" strike="noStrike" cap="none" normalizeH="0" baseline="0">
-                <a:ln>
-                  <a:noFill/>
-                </a:ln>
-                <a:solidFill>
-                  <a:srgbClr val="A9B7C6"/>
-                </a:solidFill>
-                <a:effectLst/>
-                <a:latin typeface="Courier New" panose="02070309020205020404" pitchFamily="49" charset="0"/>
-                <a:cs typeface="Courier New" panose="02070309020205020404" pitchFamily="49" charset="0"/>
-              </a:rPr>
-              <a:t>+ ex.toString())</a:t>
-            </a:r>
-            <a:r>
-              <a:rPr kumimoji="0" lang="en-US" altLang="en-US" sz="900" b="0" i="0" u="none" strike="noStrike" cap="none" normalizeH="0" baseline="0">
+              <a:rPr kumimoji="0" lang="en-US" altLang="en-US" sz="1800" b="0" i="0" u="none" strike="noStrike" cap="none" normalizeH="0" baseline="0" dirty="0">
+                <a:ln>
+                  <a:noFill/>
+                </a:ln>
+                <a:solidFill>
+                  <a:srgbClr val="A9B7C6"/>
+                </a:solidFill>
+                <a:effectLst/>
+                <a:latin typeface="Courier New" panose="02070309020205020404" pitchFamily="49" charset="0"/>
+                <a:cs typeface="Courier New" panose="02070309020205020404" pitchFamily="49" charset="0"/>
+              </a:rPr>
+              <a:t>+ </a:t>
+            </a:r>
+            <a:r>
+              <a:rPr kumimoji="0" lang="en-US" altLang="en-US" sz="1800" b="0" i="0" u="none" strike="noStrike" cap="none" normalizeH="0" baseline="0" dirty="0" err="1">
+                <a:ln>
+                  <a:noFill/>
+                </a:ln>
+                <a:solidFill>
+                  <a:srgbClr val="A9B7C6"/>
+                </a:solidFill>
+                <a:effectLst/>
+                <a:latin typeface="Courier New" panose="02070309020205020404" pitchFamily="49" charset="0"/>
+                <a:cs typeface="Courier New" panose="02070309020205020404" pitchFamily="49" charset="0"/>
+              </a:rPr>
+              <a:t>ex.toString</a:t>
+            </a:r>
+            <a:r>
+              <a:rPr kumimoji="0" lang="en-US" altLang="en-US" sz="1800" b="0" i="0" u="none" strike="noStrike" cap="none" normalizeH="0" baseline="0" dirty="0">
+                <a:ln>
+                  <a:noFill/>
+                </a:ln>
+                <a:solidFill>
+                  <a:srgbClr val="A9B7C6"/>
+                </a:solidFill>
+                <a:effectLst/>
+                <a:latin typeface="Courier New" panose="02070309020205020404" pitchFamily="49" charset="0"/>
+                <a:cs typeface="Courier New" panose="02070309020205020404" pitchFamily="49" charset="0"/>
+              </a:rPr>
+              <a:t>())</a:t>
+            </a:r>
+            <a:r>
+              <a:rPr kumimoji="0" lang="en-US" altLang="en-US" sz="1800" b="0" i="0" u="none" strike="noStrike" cap="none" normalizeH="0" baseline="0" dirty="0">
                 <a:ln>
                   <a:noFill/>
                 </a:ln>
@@ -20690,7 +21473,7 @@
               <a:t>;</a:t>
             </a:r>
             <a:br>
-              <a:rPr kumimoji="0" lang="en-US" altLang="en-US" sz="900" b="0" i="0" u="none" strike="noStrike" cap="none" normalizeH="0" baseline="0">
+              <a:rPr kumimoji="0" lang="en-US" altLang="en-US" sz="1800" b="0" i="0" u="none" strike="noStrike" cap="none" normalizeH="0" baseline="0" dirty="0">
                 <a:ln>
                   <a:noFill/>
                 </a:ln>
@@ -20703,7 +21486,7 @@
               </a:rPr>
             </a:br>
             <a:r>
-              <a:rPr kumimoji="0" lang="en-US" altLang="en-US" sz="900" b="0" i="0" u="none" strike="noStrike" cap="none" normalizeH="0" baseline="0">
+              <a:rPr kumimoji="0" lang="en-US" altLang="en-US" sz="1800" b="0" i="0" u="none" strike="noStrike" cap="none" normalizeH="0" baseline="0" dirty="0">
                 <a:ln>
                   <a:noFill/>
                 </a:ln>
@@ -20717,7 +21500,7 @@
               <a:t>        return </a:t>
             </a:r>
             <a:r>
-              <a:rPr kumimoji="0" lang="en-US" altLang="en-US" sz="900" b="0" i="0" u="none" strike="noStrike" cap="none" normalizeH="0" baseline="0">
+              <a:rPr kumimoji="0" lang="en-US" altLang="en-US" sz="1800" b="0" i="0" u="none" strike="noStrike" cap="none" normalizeH="0" baseline="0" dirty="0" err="1">
                 <a:ln>
                   <a:noFill/>
                 </a:ln>
@@ -20731,7 +21514,7 @@
               <a:t>mav</a:t>
             </a:r>
             <a:r>
-              <a:rPr kumimoji="0" lang="en-US" altLang="en-US" sz="900" b="0" i="0" u="none" strike="noStrike" cap="none" normalizeH="0" baseline="0">
+              <a:rPr kumimoji="0" lang="en-US" altLang="en-US" sz="1800" b="0" i="0" u="none" strike="noStrike" cap="none" normalizeH="0" baseline="0" dirty="0">
                 <a:ln>
                   <a:noFill/>
                 </a:ln>
@@ -20745,7 +21528,7 @@
               <a:t>;</a:t>
             </a:r>
             <a:br>
-              <a:rPr kumimoji="0" lang="en-US" altLang="en-US" sz="900" b="0" i="0" u="none" strike="noStrike" cap="none" normalizeH="0" baseline="0">
+              <a:rPr kumimoji="0" lang="en-US" altLang="en-US" sz="1800" b="0" i="0" u="none" strike="noStrike" cap="none" normalizeH="0" baseline="0" dirty="0">
                 <a:ln>
                   <a:noFill/>
                 </a:ln>
@@ -20758,7 +21541,7 @@
               </a:rPr>
             </a:br>
             <a:r>
-              <a:rPr kumimoji="0" lang="en-US" altLang="en-US" sz="900" b="0" i="0" u="none" strike="noStrike" cap="none" normalizeH="0" baseline="0">
+              <a:rPr kumimoji="0" lang="en-US" altLang="en-US" sz="1800" b="0" i="0" u="none" strike="noStrike" cap="none" normalizeH="0" baseline="0" dirty="0">
                 <a:ln>
                   <a:noFill/>
                 </a:ln>
@@ -20772,7 +21555,7 @@
               <a:t>    </a:t>
             </a:r>
             <a:r>
-              <a:rPr kumimoji="0" lang="en-US" altLang="en-US" sz="900" b="0" i="0" u="none" strike="noStrike" cap="none" normalizeH="0" baseline="0">
+              <a:rPr kumimoji="0" lang="en-US" altLang="en-US" sz="1800" b="0" i="0" u="none" strike="noStrike" cap="none" normalizeH="0" baseline="0" dirty="0">
                 <a:ln>
                   <a:noFill/>
                 </a:ln>
@@ -20786,7 +21569,7 @@
               <a:t>}</a:t>
             </a:r>
             <a:br>
-              <a:rPr kumimoji="0" lang="en-US" altLang="en-US" sz="900" b="0" i="0" u="none" strike="noStrike" cap="none" normalizeH="0" baseline="0">
+              <a:rPr kumimoji="0" lang="en-US" altLang="en-US" sz="1800" b="0" i="0" u="none" strike="noStrike" cap="none" normalizeH="0" baseline="0" dirty="0">
                 <a:ln>
                   <a:noFill/>
                 </a:ln>
@@ -20799,7 +21582,7 @@
               </a:rPr>
             </a:br>
             <a:r>
-              <a:rPr kumimoji="0" lang="en-US" altLang="en-US" sz="900" b="0" i="0" u="none" strike="noStrike" cap="none" normalizeH="0" baseline="0">
+              <a:rPr kumimoji="0" lang="en-US" altLang="en-US" sz="1800" b="0" i="0" u="none" strike="noStrike" cap="none" normalizeH="0" baseline="0" dirty="0">
                 <a:ln>
                   <a:noFill/>
                 </a:ln>
@@ -20812,7 +21595,7 @@
               </a:rPr>
               <a:t>}</a:t>
             </a:r>
-            <a:endParaRPr kumimoji="0" lang="en-US" altLang="en-US" sz="1800" b="0" i="0" u="none" strike="noStrike" cap="none" normalizeH="0" baseline="0">
+            <a:endParaRPr kumimoji="0" lang="en-US" altLang="en-US" sz="1800" b="0" i="0" u="none" strike="noStrike" cap="none" normalizeH="0" baseline="0" dirty="0">
               <a:ln>
                 <a:noFill/>
               </a:ln>
@@ -20895,7 +21678,7 @@
           </a:bodyPr>
           <a:lstStyle/>
           <a:p>
-            <a:pPr lvl="1">
+            <a:pPr>
               <a:lnSpc>
                 <a:spcPct val="150000"/>
               </a:lnSpc>
@@ -20909,13 +21692,13 @@
             <a:endParaRPr lang="en-US" dirty="0"/>
           </a:p>
           <a:p>
-            <a:pPr lvl="1">
+            <a:pPr>
               <a:lnSpc>
                 <a:spcPct val="150000"/>
               </a:lnSpc>
             </a:pPr>
             <a:r>
-              <a:rPr lang="en-US">
+              <a:rPr lang="en-US" dirty="0">
                 <a:hlinkClick r:id="rId4"/>
               </a:rPr>
               <a:t>Spring Tutorial</a:t>
@@ -20923,7 +21706,7 @@
             <a:endParaRPr lang="en-US" dirty="0"/>
           </a:p>
           <a:p>
-            <a:pPr lvl="1">
+            <a:pPr>
               <a:lnSpc>
                 <a:spcPct val="150000"/>
               </a:lnSpc>
@@ -20937,7 +21720,7 @@
             <a:endParaRPr lang="en-US" dirty="0"/>
           </a:p>
           <a:p>
-            <a:pPr lvl="1">
+            <a:pPr>
               <a:lnSpc>
                 <a:spcPct val="150000"/>
               </a:lnSpc>
@@ -20999,8 +21782,13 @@
           <a:p>
             <a:r>
               <a:rPr lang="en-US" dirty="0"/>
-              <a:t>Homework 1</a:t>
-            </a:r>
+              <a:t>Homework </a:t>
+            </a:r>
+            <a:r>
+              <a:rPr lang="en-US" dirty="0" smtClean="0"/>
+              <a:t>Task 1</a:t>
+            </a:r>
+            <a:endParaRPr lang="en-US" dirty="0"/>
           </a:p>
         </p:txBody>
       </p:sp>
@@ -21030,12 +21818,19 @@
             </a:pPr>
             <a:r>
               <a:rPr lang="en-US" dirty="0"/>
-              <a:t>Use Spring to create WEB application from </a:t>
-            </a:r>
-            <a:r>
-              <a:rPr lang="en-US" b="1" dirty="0"/>
-              <a:t>Lecture 15</a:t>
-            </a:r>
+              <a:t>Implement user management API protected with authentication by login and password using Spring </a:t>
+            </a:r>
+            <a:r>
+              <a:rPr lang="en-US"/>
+              <a:t>MVC </a:t>
+            </a:r>
+            <a:r>
+              <a:rPr lang="en-US" smtClean="0">
+                <a:hlinkClick r:id="rId2"/>
+              </a:rPr>
+              <a:t>requirements</a:t>
+            </a:r>
+            <a:endParaRPr lang="en-US" b="1" dirty="0" smtClean="0"/>
           </a:p>
           <a:p>
             <a:pPr marL="514350" indent="-514350">
@@ -21046,8 +21841,28 @@
               <a:buAutoNum type="arabicPeriod"/>
             </a:pPr>
             <a:r>
+              <a:rPr lang="en-US" dirty="0" smtClean="0"/>
+              <a:t>Add custom request logging </a:t>
+            </a:r>
+            <a:r>
               <a:rPr lang="en-US" dirty="0"/>
-              <a:t>Add custom interceptor using Java config</a:t>
+              <a:t>interceptor using Java </a:t>
+            </a:r>
+            <a:r>
+              <a:rPr lang="en-US" dirty="0" err="1" smtClean="0"/>
+              <a:t>config</a:t>
+            </a:r>
+            <a:r>
+              <a:rPr lang="en-US" dirty="0" smtClean="0"/>
+              <a:t>. Interceptor </a:t>
+            </a:r>
+            <a:r>
+              <a:rPr lang="en-US" dirty="0"/>
+              <a:t>should </a:t>
+            </a:r>
+            <a:r>
+              <a:rPr lang="en-US" dirty="0" smtClean="0"/>
+              <a:t>print:</a:t>
             </a:r>
           </a:p>
           <a:p>
@@ -21057,57 +21872,58 @@
               </a:lnSpc>
             </a:pPr>
             <a:r>
+              <a:rPr lang="en-US" dirty="0" smtClean="0"/>
+              <a:t>Information </a:t>
+            </a:r>
+            <a:r>
               <a:rPr lang="en-US" dirty="0"/>
-              <a:t>Interceptor should print:</a:t>
+              <a:t>about request start (including date, time, link, all request parameters, method that was used (GET, POST, PUT, </a:t>
+            </a:r>
+            <a:r>
+              <a:rPr lang="en-US" dirty="0" err="1"/>
+              <a:t>etc</a:t>
+            </a:r>
+            <a:r>
+              <a:rPr lang="en-US" dirty="0" smtClean="0"/>
+              <a:t>))</a:t>
             </a:r>
           </a:p>
           <a:p>
-            <a:pPr lvl="2">
+            <a:pPr lvl="1">
               <a:lnSpc>
                 <a:spcPct val="170000"/>
               </a:lnSpc>
             </a:pPr>
             <a:r>
+              <a:rPr lang="en-US" dirty="0" smtClean="0"/>
+              <a:t>Information </a:t>
+            </a:r>
+            <a:r>
               <a:rPr lang="en-US" dirty="0"/>
-              <a:t>Information about request start (including date, time, link, all request parameters, method that was used (GET, POST, PUT, </a:t>
+              <a:t>about request end (including date, time, link, time was spend for request processing, method that was used (GET, POST, PUT, </a:t>
             </a:r>
             <a:r>
               <a:rPr lang="en-US" dirty="0" err="1"/>
               <a:t>etc</a:t>
             </a:r>
             <a:r>
-              <a:rPr lang="en-US" dirty="0"/>
+              <a:rPr lang="en-US" dirty="0" smtClean="0"/>
               <a:t>))</a:t>
             </a:r>
           </a:p>
           <a:p>
-            <a:pPr lvl="2">
+            <a:pPr lvl="1">
               <a:lnSpc>
                 <a:spcPct val="170000"/>
               </a:lnSpc>
             </a:pPr>
             <a:r>
+              <a:rPr lang="en-US" dirty="0" smtClean="0"/>
+              <a:t>Information </a:t>
+            </a:r>
+            <a:r>
               <a:rPr lang="en-US" dirty="0"/>
-              <a:t>Information about request end (including date, time, link, time was spend for request processing, method that was used (GET, POST, PUT, </a:t>
-            </a:r>
-            <a:r>
-              <a:rPr lang="en-US" dirty="0" err="1"/>
-              <a:t>etc</a:t>
-            </a:r>
-            <a:r>
-              <a:rPr lang="en-US" dirty="0"/>
-              <a:t>))</a:t>
-            </a:r>
-          </a:p>
-          <a:p>
-            <a:pPr lvl="2">
-              <a:lnSpc>
-                <a:spcPct val="170000"/>
-              </a:lnSpc>
-            </a:pPr>
-            <a:r>
-              <a:rPr lang="en-US" dirty="0"/>
-              <a:t>Information about exception if happened</a:t>
+              <a:t>about exception if happened</a:t>
             </a:r>
           </a:p>
           <a:p>
@@ -21128,8 +21944,17 @@
             </a:r>
             <a:r>
               <a:rPr lang="en-US" dirty="0"/>
-              <a:t> with handling some custom exceptions (prepare endpoints that can throw this exception)</a:t>
-            </a:r>
+              <a:t> </a:t>
+            </a:r>
+            <a:r>
+              <a:rPr lang="en-US" dirty="0"/>
+              <a:t>for exceptions </a:t>
+            </a:r>
+            <a:r>
+              <a:rPr lang="en-US" dirty="0" smtClean="0"/>
+              <a:t>handling;</a:t>
+            </a:r>
+            <a:endParaRPr lang="en-US" dirty="0"/>
           </a:p>
           <a:p>
             <a:pPr marL="514350" indent="-514350">
@@ -21141,8 +21966,17 @@
             </a:pPr>
             <a:r>
               <a:rPr lang="en-US" dirty="0"/>
-              <a:t>Add custom JSON message converter using Java config</a:t>
-            </a:r>
+              <a:t>Add custom JSON message converter using Java </a:t>
+            </a:r>
+            <a:r>
+              <a:rPr lang="en-US" dirty="0" err="1" smtClean="0"/>
+              <a:t>config</a:t>
+            </a:r>
+            <a:r>
+              <a:rPr lang="en-US" dirty="0" smtClean="0"/>
+              <a:t>;</a:t>
+            </a:r>
+            <a:endParaRPr lang="en-US" dirty="0"/>
           </a:p>
           <a:p>
             <a:pPr lvl="1">
@@ -21151,8 +21985,12 @@
               </a:lnSpc>
             </a:pPr>
             <a:r>
+              <a:rPr lang="en-US" dirty="0" smtClean="0"/>
+              <a:t>Add </a:t>
+            </a:r>
+            <a:r>
               <a:rPr lang="en-US" dirty="0"/>
-              <a:t>Add few endpoints that return different </a:t>
+              <a:t>endpoints that return different </a:t>
             </a:r>
             <a:r>
               <a:rPr lang="en-US" dirty="0" err="1"/>
@@ -21176,8 +22014,35 @@
             </a:r>
             <a:r>
               <a:rPr lang="en-US" dirty="0"/>
-              <a:t> to show that converter works</a:t>
-            </a:r>
+              <a:t> to show that converter </a:t>
+            </a:r>
+            <a:r>
+              <a:rPr lang="en-US" dirty="0" smtClean="0"/>
+              <a:t>works;</a:t>
+            </a:r>
+            <a:endParaRPr lang="en-US" dirty="0"/>
+          </a:p>
+          <a:p>
+            <a:pPr marL="514350" indent="-514350">
+              <a:lnSpc>
+                <a:spcPct val="170000"/>
+              </a:lnSpc>
+              <a:buFont typeface="+mj-lt"/>
+              <a:buAutoNum type="arabicPeriod"/>
+            </a:pPr>
+            <a:r>
+              <a:rPr lang="en-US" dirty="0" smtClean="0"/>
+              <a:t>Use </a:t>
+            </a:r>
+            <a:r>
+              <a:rPr lang="en-US" dirty="0"/>
+              <a:t>your knowledge from previous tasks and review </a:t>
+            </a:r>
+            <a:r>
+              <a:rPr lang="en-US" dirty="0" smtClean="0"/>
+              <a:t>feedbacks</a:t>
+            </a:r>
+            <a:endParaRPr lang="en-US" dirty="0" smtClean="0"/>
           </a:p>
         </p:txBody>
       </p:sp>
@@ -22458,6 +23323,20 @@
                 <a:cs typeface="Courier New" panose="02070309020205020404" pitchFamily="49" charset="0"/>
               </a:rPr>
             </a:br>
+            <a:r>
+              <a:rPr kumimoji="0" lang="en-US" altLang="en-US" sz="900" b="0" i="0" u="none" strike="noStrike" cap="none" normalizeH="0" baseline="0">
+                <a:ln>
+                  <a:noFill/>
+                </a:ln>
+                <a:solidFill>
+                  <a:srgbClr val="E8BF6A"/>
+                </a:solidFill>
+                <a:effectLst/>
+                <a:latin typeface="Courier New" panose="02070309020205020404" pitchFamily="49" charset="0"/>
+                <a:cs typeface="Courier New" panose="02070309020205020404" pitchFamily="49" charset="0"/>
+              </a:rPr>
+              <a:t/>
+            </a:r>
             <a:br>
               <a:rPr kumimoji="0" lang="en-US" altLang="en-US" sz="900" b="0" i="0" u="none" strike="noStrike" cap="none" normalizeH="0" baseline="0">
                 <a:ln>
@@ -23577,6 +24456,20 @@
                 <a:cs typeface="Courier New" panose="02070309020205020404" pitchFamily="49" charset="0"/>
               </a:rPr>
             </a:br>
+            <a:r>
+              <a:rPr kumimoji="0" lang="en-US" altLang="en-US" sz="900" b="0" i="0" u="none" strike="noStrike" cap="none" normalizeH="0" baseline="0">
+                <a:ln>
+                  <a:noFill/>
+                </a:ln>
+                <a:solidFill>
+                  <a:srgbClr val="E8BF6A"/>
+                </a:solidFill>
+                <a:effectLst/>
+                <a:latin typeface="Courier New" panose="02070309020205020404" pitchFamily="49" charset="0"/>
+                <a:cs typeface="Courier New" panose="02070309020205020404" pitchFamily="49" charset="0"/>
+              </a:rPr>
+              <a:t/>
+            </a:r>
             <a:br>
               <a:rPr kumimoji="0" lang="en-US" altLang="en-US" sz="900" b="0" i="0" u="none" strike="noStrike" cap="none" normalizeH="0" baseline="0">
                 <a:ln>

</xml_diff>